<commit_message>
Updated README and deliverables
</commit_message>
<xml_diff>
--- a/docs/presentation.pptx
+++ b/docs/presentation.pptx
@@ -4,28 +4,31 @@
   <p:sldMasterIdLst>
     <p:sldMasterId id="2147483660" r:id="rId1"/>
   </p:sldMasterIdLst>
+  <p:notesMasterIdLst>
+    <p:notesMasterId r:id="rId27"/>
+  </p:notesMasterIdLst>
   <p:sldIdLst>
     <p:sldId id="256" r:id="rId2"/>
     <p:sldId id="257" r:id="rId3"/>
     <p:sldId id="277" r:id="rId4"/>
     <p:sldId id="258" r:id="rId5"/>
-    <p:sldId id="259" r:id="rId6"/>
-    <p:sldId id="275" r:id="rId7"/>
-    <p:sldId id="274" r:id="rId8"/>
-    <p:sldId id="278" r:id="rId9"/>
-    <p:sldId id="273" r:id="rId10"/>
-    <p:sldId id="276" r:id="rId11"/>
-    <p:sldId id="279" r:id="rId12"/>
-    <p:sldId id="280" r:id="rId13"/>
-    <p:sldId id="268" r:id="rId14"/>
-    <p:sldId id="271" r:id="rId15"/>
-    <p:sldId id="260" r:id="rId16"/>
-    <p:sldId id="270" r:id="rId17"/>
-    <p:sldId id="261" r:id="rId18"/>
-    <p:sldId id="269" r:id="rId19"/>
-    <p:sldId id="262" r:id="rId20"/>
-    <p:sldId id="263" r:id="rId21"/>
-    <p:sldId id="272" r:id="rId22"/>
+    <p:sldId id="276" r:id="rId6"/>
+    <p:sldId id="279" r:id="rId7"/>
+    <p:sldId id="280" r:id="rId8"/>
+    <p:sldId id="268" r:id="rId9"/>
+    <p:sldId id="271" r:id="rId10"/>
+    <p:sldId id="260" r:id="rId11"/>
+    <p:sldId id="270" r:id="rId12"/>
+    <p:sldId id="261" r:id="rId13"/>
+    <p:sldId id="269" r:id="rId14"/>
+    <p:sldId id="262" r:id="rId15"/>
+    <p:sldId id="263" r:id="rId16"/>
+    <p:sldId id="272" r:id="rId17"/>
+    <p:sldId id="259" r:id="rId18"/>
+    <p:sldId id="275" r:id="rId19"/>
+    <p:sldId id="274" r:id="rId20"/>
+    <p:sldId id="278" r:id="rId21"/>
+    <p:sldId id="273" r:id="rId22"/>
     <p:sldId id="267" r:id="rId23"/>
     <p:sldId id="264" r:id="rId24"/>
     <p:sldId id="265" r:id="rId25"/>
@@ -136,6 +139,1150 @@
 </p:presentation>
 </file>
 
+<file path=ppt/commentAuthors.xml><?xml version="1.0" encoding="utf-8"?>
+<p:cmAuthorLst xmlns:a="http://schemas.openxmlformats.org/drawingml/2006/main" xmlns:r="http://schemas.openxmlformats.org/officeDocument/2006/relationships" xmlns:p="http://schemas.openxmlformats.org/presentationml/2006/main">
+  <p:cmAuthor id="1" name="Bret" initials="B" lastIdx="1" clrIdx="0">
+    <p:extLst>
+      <p:ext uri="{19B8F6BF-5375-455C-9EA6-DF929625EA0E}">
+        <p15:presenceInfo xmlns:p15="http://schemas.microsoft.com/office/powerpoint/2012/main" userId="Bret" providerId="None"/>
+      </p:ext>
+    </p:extLst>
+  </p:cmAuthor>
+</p:cmAuthorLst>
+</file>
+
+<file path=ppt/notesMasters/notesMaster1.xml><?xml version="1.0" encoding="utf-8"?>
+<p:notesMaster xmlns:a="http://schemas.openxmlformats.org/drawingml/2006/main" xmlns:r="http://schemas.openxmlformats.org/officeDocument/2006/relationships" xmlns:p="http://schemas.openxmlformats.org/presentationml/2006/main">
+  <p:cSld>
+    <p:bg>
+      <p:bgRef idx="1001">
+        <a:schemeClr val="bg1"/>
+      </p:bgRef>
+    </p:bg>
+    <p:spTree>
+      <p:nvGrpSpPr>
+        <p:cNvPr id="1" name=""/>
+        <p:cNvGrpSpPr/>
+        <p:nvPr/>
+      </p:nvGrpSpPr>
+      <p:grpSpPr>
+        <a:xfrm>
+          <a:off x="0" y="0"/>
+          <a:ext cx="0" cy="0"/>
+          <a:chOff x="0" y="0"/>
+          <a:chExt cx="0" cy="0"/>
+        </a:xfrm>
+      </p:grpSpPr>
+      <p:sp>
+        <p:nvSpPr>
+          <p:cNvPr id="2" name="Header Placeholder 1"/>
+          <p:cNvSpPr>
+            <a:spLocks noGrp="1"/>
+          </p:cNvSpPr>
+          <p:nvPr>
+            <p:ph type="hdr" sz="quarter"/>
+          </p:nvPr>
+        </p:nvSpPr>
+        <p:spPr>
+          <a:xfrm>
+            <a:off x="0" y="0"/>
+            <a:ext cx="2971800" cy="458788"/>
+          </a:xfrm>
+          <a:prstGeom prst="rect">
+            <a:avLst/>
+          </a:prstGeom>
+        </p:spPr>
+        <p:txBody>
+          <a:bodyPr vert="horz" lIns="91440" tIns="45720" rIns="91440" bIns="45720" rtlCol="0"/>
+          <a:lstStyle>
+            <a:lvl1pPr algn="l">
+              <a:defRPr sz="1200"/>
+            </a:lvl1pPr>
+          </a:lstStyle>
+          <a:p>
+            <a:endParaRPr lang="en-US"/>
+          </a:p>
+        </p:txBody>
+      </p:sp>
+      <p:sp>
+        <p:nvSpPr>
+          <p:cNvPr id="3" name="Date Placeholder 2"/>
+          <p:cNvSpPr>
+            <a:spLocks noGrp="1"/>
+          </p:cNvSpPr>
+          <p:nvPr>
+            <p:ph type="dt" idx="1"/>
+          </p:nvPr>
+        </p:nvSpPr>
+        <p:spPr>
+          <a:xfrm>
+            <a:off x="3884613" y="0"/>
+            <a:ext cx="2971800" cy="458788"/>
+          </a:xfrm>
+          <a:prstGeom prst="rect">
+            <a:avLst/>
+          </a:prstGeom>
+        </p:spPr>
+        <p:txBody>
+          <a:bodyPr vert="horz" lIns="91440" tIns="45720" rIns="91440" bIns="45720" rtlCol="0"/>
+          <a:lstStyle>
+            <a:lvl1pPr algn="r">
+              <a:defRPr sz="1200"/>
+            </a:lvl1pPr>
+          </a:lstStyle>
+          <a:p>
+            <a:fld id="{AF5FE7E7-77A7-43B7-8FA4-F02A3AEE8E72}" type="datetimeFigureOut">
+              <a:rPr lang="en-US" smtClean="0"/>
+              <a:t>12/15/2016</a:t>
+            </a:fld>
+            <a:endParaRPr lang="en-US"/>
+          </a:p>
+        </p:txBody>
+      </p:sp>
+      <p:sp>
+        <p:nvSpPr>
+          <p:cNvPr id="4" name="Slide Image Placeholder 3"/>
+          <p:cNvSpPr>
+            <a:spLocks noGrp="1" noRot="1" noChangeAspect="1"/>
+          </p:cNvSpPr>
+          <p:nvPr>
+            <p:ph type="sldImg" idx="2"/>
+          </p:nvPr>
+        </p:nvSpPr>
+        <p:spPr>
+          <a:xfrm>
+            <a:off x="685800" y="1143000"/>
+            <a:ext cx="5486400" cy="3086100"/>
+          </a:xfrm>
+          <a:prstGeom prst="rect">
+            <a:avLst/>
+          </a:prstGeom>
+          <a:noFill/>
+          <a:ln w="12700">
+            <a:solidFill>
+              <a:prstClr val="black"/>
+            </a:solidFill>
+          </a:ln>
+        </p:spPr>
+        <p:txBody>
+          <a:bodyPr vert="horz" lIns="91440" tIns="45720" rIns="91440" bIns="45720" rtlCol="0" anchor="ctr"/>
+          <a:lstStyle/>
+          <a:p>
+            <a:endParaRPr lang="en-US"/>
+          </a:p>
+        </p:txBody>
+      </p:sp>
+      <p:sp>
+        <p:nvSpPr>
+          <p:cNvPr id="5" name="Notes Placeholder 4"/>
+          <p:cNvSpPr>
+            <a:spLocks noGrp="1"/>
+          </p:cNvSpPr>
+          <p:nvPr>
+            <p:ph type="body" sz="quarter" idx="3"/>
+          </p:nvPr>
+        </p:nvSpPr>
+        <p:spPr>
+          <a:xfrm>
+            <a:off x="685800" y="4400550"/>
+            <a:ext cx="5486400" cy="3600450"/>
+          </a:xfrm>
+          <a:prstGeom prst="rect">
+            <a:avLst/>
+          </a:prstGeom>
+        </p:spPr>
+        <p:txBody>
+          <a:bodyPr vert="horz" lIns="91440" tIns="45720" rIns="91440" bIns="45720" rtlCol="0"/>
+          <a:lstStyle/>
+          <a:p>
+            <a:pPr lvl="0"/>
+            <a:r>
+              <a:rPr lang="en-US"/>
+              <a:t>Edit Master text styles</a:t>
+            </a:r>
+          </a:p>
+          <a:p>
+            <a:pPr lvl="1"/>
+            <a:r>
+              <a:rPr lang="en-US"/>
+              <a:t>Second level</a:t>
+            </a:r>
+          </a:p>
+          <a:p>
+            <a:pPr lvl="2"/>
+            <a:r>
+              <a:rPr lang="en-US"/>
+              <a:t>Third level</a:t>
+            </a:r>
+          </a:p>
+          <a:p>
+            <a:pPr lvl="3"/>
+            <a:r>
+              <a:rPr lang="en-US"/>
+              <a:t>Fourth level</a:t>
+            </a:r>
+          </a:p>
+          <a:p>
+            <a:pPr lvl="4"/>
+            <a:r>
+              <a:rPr lang="en-US"/>
+              <a:t>Fifth level</a:t>
+            </a:r>
+            <a:endParaRPr lang="en-US"/>
+          </a:p>
+        </p:txBody>
+      </p:sp>
+      <p:sp>
+        <p:nvSpPr>
+          <p:cNvPr id="6" name="Footer Placeholder 5"/>
+          <p:cNvSpPr>
+            <a:spLocks noGrp="1"/>
+          </p:cNvSpPr>
+          <p:nvPr>
+            <p:ph type="ftr" sz="quarter" idx="4"/>
+          </p:nvPr>
+        </p:nvSpPr>
+        <p:spPr>
+          <a:xfrm>
+            <a:off x="0" y="8685213"/>
+            <a:ext cx="2971800" cy="458787"/>
+          </a:xfrm>
+          <a:prstGeom prst="rect">
+            <a:avLst/>
+          </a:prstGeom>
+        </p:spPr>
+        <p:txBody>
+          <a:bodyPr vert="horz" lIns="91440" tIns="45720" rIns="91440" bIns="45720" rtlCol="0" anchor="b"/>
+          <a:lstStyle>
+            <a:lvl1pPr algn="l">
+              <a:defRPr sz="1200"/>
+            </a:lvl1pPr>
+          </a:lstStyle>
+          <a:p>
+            <a:endParaRPr lang="en-US"/>
+          </a:p>
+        </p:txBody>
+      </p:sp>
+      <p:sp>
+        <p:nvSpPr>
+          <p:cNvPr id="7" name="Slide Number Placeholder 6"/>
+          <p:cNvSpPr>
+            <a:spLocks noGrp="1"/>
+          </p:cNvSpPr>
+          <p:nvPr>
+            <p:ph type="sldNum" sz="quarter" idx="5"/>
+          </p:nvPr>
+        </p:nvSpPr>
+        <p:spPr>
+          <a:xfrm>
+            <a:off x="3884613" y="8685213"/>
+            <a:ext cx="2971800" cy="458787"/>
+          </a:xfrm>
+          <a:prstGeom prst="rect">
+            <a:avLst/>
+          </a:prstGeom>
+        </p:spPr>
+        <p:txBody>
+          <a:bodyPr vert="horz" lIns="91440" tIns="45720" rIns="91440" bIns="45720" rtlCol="0" anchor="b"/>
+          <a:lstStyle>
+            <a:lvl1pPr algn="r">
+              <a:defRPr sz="1200"/>
+            </a:lvl1pPr>
+          </a:lstStyle>
+          <a:p>
+            <a:fld id="{0FB58104-7A71-4148-9C2F-5C9F9A601E34}" type="slidenum">
+              <a:rPr lang="en-US" smtClean="0"/>
+              <a:t>‹#›</a:t>
+            </a:fld>
+            <a:endParaRPr lang="en-US"/>
+          </a:p>
+        </p:txBody>
+      </p:sp>
+    </p:spTree>
+    <p:extLst>
+      <p:ext uri="{BB962C8B-B14F-4D97-AF65-F5344CB8AC3E}">
+        <p14:creationId xmlns:p14="http://schemas.microsoft.com/office/powerpoint/2010/main" val="2880539732"/>
+      </p:ext>
+    </p:extLst>
+  </p:cSld>
+  <p:clrMap bg1="lt1" tx1="dk1" bg2="lt2" tx2="dk2" accent1="accent1" accent2="accent2" accent3="accent3" accent4="accent4" accent5="accent5" accent6="accent6" hlink="hlink" folHlink="folHlink"/>
+  <p:notesStyle>
+    <a:lvl1pPr marL="0" algn="l" defTabSz="914400" rtl="0" eaLnBrk="1" latinLnBrk="0" hangingPunct="1">
+      <a:defRPr sz="1200" kern="1200">
+        <a:solidFill>
+          <a:schemeClr val="tx1"/>
+        </a:solidFill>
+        <a:latin typeface="+mn-lt"/>
+        <a:ea typeface="+mn-ea"/>
+        <a:cs typeface="+mn-cs"/>
+      </a:defRPr>
+    </a:lvl1pPr>
+    <a:lvl2pPr marL="457200" algn="l" defTabSz="914400" rtl="0" eaLnBrk="1" latinLnBrk="0" hangingPunct="1">
+      <a:defRPr sz="1200" kern="1200">
+        <a:solidFill>
+          <a:schemeClr val="tx1"/>
+        </a:solidFill>
+        <a:latin typeface="+mn-lt"/>
+        <a:ea typeface="+mn-ea"/>
+        <a:cs typeface="+mn-cs"/>
+      </a:defRPr>
+    </a:lvl2pPr>
+    <a:lvl3pPr marL="914400" algn="l" defTabSz="914400" rtl="0" eaLnBrk="1" latinLnBrk="0" hangingPunct="1">
+      <a:defRPr sz="1200" kern="1200">
+        <a:solidFill>
+          <a:schemeClr val="tx1"/>
+        </a:solidFill>
+        <a:latin typeface="+mn-lt"/>
+        <a:ea typeface="+mn-ea"/>
+        <a:cs typeface="+mn-cs"/>
+      </a:defRPr>
+    </a:lvl3pPr>
+    <a:lvl4pPr marL="1371600" algn="l" defTabSz="914400" rtl="0" eaLnBrk="1" latinLnBrk="0" hangingPunct="1">
+      <a:defRPr sz="1200" kern="1200">
+        <a:solidFill>
+          <a:schemeClr val="tx1"/>
+        </a:solidFill>
+        <a:latin typeface="+mn-lt"/>
+        <a:ea typeface="+mn-ea"/>
+        <a:cs typeface="+mn-cs"/>
+      </a:defRPr>
+    </a:lvl4pPr>
+    <a:lvl5pPr marL="1828800" algn="l" defTabSz="914400" rtl="0" eaLnBrk="1" latinLnBrk="0" hangingPunct="1">
+      <a:defRPr sz="1200" kern="1200">
+        <a:solidFill>
+          <a:schemeClr val="tx1"/>
+        </a:solidFill>
+        <a:latin typeface="+mn-lt"/>
+        <a:ea typeface="+mn-ea"/>
+        <a:cs typeface="+mn-cs"/>
+      </a:defRPr>
+    </a:lvl5pPr>
+    <a:lvl6pPr marL="2286000" algn="l" defTabSz="914400" rtl="0" eaLnBrk="1" latinLnBrk="0" hangingPunct="1">
+      <a:defRPr sz="1200" kern="1200">
+        <a:solidFill>
+          <a:schemeClr val="tx1"/>
+        </a:solidFill>
+        <a:latin typeface="+mn-lt"/>
+        <a:ea typeface="+mn-ea"/>
+        <a:cs typeface="+mn-cs"/>
+      </a:defRPr>
+    </a:lvl6pPr>
+    <a:lvl7pPr marL="2743200" algn="l" defTabSz="914400" rtl="0" eaLnBrk="1" latinLnBrk="0" hangingPunct="1">
+      <a:defRPr sz="1200" kern="1200">
+        <a:solidFill>
+          <a:schemeClr val="tx1"/>
+        </a:solidFill>
+        <a:latin typeface="+mn-lt"/>
+        <a:ea typeface="+mn-ea"/>
+        <a:cs typeface="+mn-cs"/>
+      </a:defRPr>
+    </a:lvl7pPr>
+    <a:lvl8pPr marL="3200400" algn="l" defTabSz="914400" rtl="0" eaLnBrk="1" latinLnBrk="0" hangingPunct="1">
+      <a:defRPr sz="1200" kern="1200">
+        <a:solidFill>
+          <a:schemeClr val="tx1"/>
+        </a:solidFill>
+        <a:latin typeface="+mn-lt"/>
+        <a:ea typeface="+mn-ea"/>
+        <a:cs typeface="+mn-cs"/>
+      </a:defRPr>
+    </a:lvl8pPr>
+    <a:lvl9pPr marL="3657600" algn="l" defTabSz="914400" rtl="0" eaLnBrk="1" latinLnBrk="0" hangingPunct="1">
+      <a:defRPr sz="1200" kern="1200">
+        <a:solidFill>
+          <a:schemeClr val="tx1"/>
+        </a:solidFill>
+        <a:latin typeface="+mn-lt"/>
+        <a:ea typeface="+mn-ea"/>
+        <a:cs typeface="+mn-cs"/>
+      </a:defRPr>
+    </a:lvl9pPr>
+  </p:notesStyle>
+</p:notesMaster>
+</file>
+
+<file path=ppt/notesSlides/notesSlide1.xml><?xml version="1.0" encoding="utf-8"?>
+<p:notes xmlns:a="http://schemas.openxmlformats.org/drawingml/2006/main" xmlns:r="http://schemas.openxmlformats.org/officeDocument/2006/relationships" xmlns:p="http://schemas.openxmlformats.org/presentationml/2006/main">
+  <p:cSld>
+    <p:spTree>
+      <p:nvGrpSpPr>
+        <p:cNvPr id="1" name=""/>
+        <p:cNvGrpSpPr/>
+        <p:nvPr/>
+      </p:nvGrpSpPr>
+      <p:grpSpPr>
+        <a:xfrm>
+          <a:off x="0" y="0"/>
+          <a:ext cx="0" cy="0"/>
+          <a:chOff x="0" y="0"/>
+          <a:chExt cx="0" cy="0"/>
+        </a:xfrm>
+      </p:grpSpPr>
+      <p:sp>
+        <p:nvSpPr>
+          <p:cNvPr id="2" name="Slide Image Placeholder 1"/>
+          <p:cNvSpPr>
+            <a:spLocks noGrp="1" noRot="1" noChangeAspect="1"/>
+          </p:cNvSpPr>
+          <p:nvPr>
+            <p:ph type="sldImg"/>
+          </p:nvPr>
+        </p:nvSpPr>
+        <p:spPr/>
+      </p:sp>
+      <p:sp>
+        <p:nvSpPr>
+          <p:cNvPr id="3" name="Notes Placeholder 2"/>
+          <p:cNvSpPr>
+            <a:spLocks noGrp="1"/>
+          </p:cNvSpPr>
+          <p:nvPr>
+            <p:ph type="body" idx="1"/>
+          </p:nvPr>
+        </p:nvSpPr>
+        <p:spPr/>
+        <p:txBody>
+          <a:bodyPr/>
+          <a:lstStyle/>
+          <a:p>
+            <a:r>
+              <a:rPr lang="en-US" dirty="0"/>
+              <a:t>No</a:t>
+            </a:r>
+            <a:r>
+              <a:rPr lang="en-US" baseline="0" dirty="0"/>
+              <a:t> matter how you look at it crime is a very prevalent issue</a:t>
+            </a:r>
+          </a:p>
+          <a:p>
+            <a:r>
+              <a:rPr lang="en-US" baseline="0" dirty="0"/>
+              <a:t>Lots of crimes coming in and adding to the pile, the dataset I pulled from is constantly being updated</a:t>
+            </a:r>
+          </a:p>
+          <a:p>
+            <a:r>
+              <a:rPr lang="en-US" baseline="0" dirty="0"/>
+              <a:t>This data is pretty much what you’d expect, location, date, maybe an offense code of some kind, what type of crime was committed</a:t>
+            </a:r>
+          </a:p>
+          <a:p>
+            <a:r>
+              <a:rPr lang="en-US" baseline="0" dirty="0"/>
+              <a:t>Wanted a way to visualize this data, in this case primarily geographic</a:t>
+            </a:r>
+            <a:endParaRPr lang="en-US" dirty="0"/>
+          </a:p>
+        </p:txBody>
+      </p:sp>
+      <p:sp>
+        <p:nvSpPr>
+          <p:cNvPr id="4" name="Slide Number Placeholder 3"/>
+          <p:cNvSpPr>
+            <a:spLocks noGrp="1"/>
+          </p:cNvSpPr>
+          <p:nvPr>
+            <p:ph type="sldNum" sz="quarter" idx="10"/>
+          </p:nvPr>
+        </p:nvSpPr>
+        <p:spPr/>
+        <p:txBody>
+          <a:bodyPr/>
+          <a:lstStyle/>
+          <a:p>
+            <a:fld id="{0FB58104-7A71-4148-9C2F-5C9F9A601E34}" type="slidenum">
+              <a:rPr lang="en-US" smtClean="0"/>
+              <a:t>2</a:t>
+            </a:fld>
+            <a:endParaRPr lang="en-US"/>
+          </a:p>
+        </p:txBody>
+      </p:sp>
+    </p:spTree>
+    <p:extLst>
+      <p:ext uri="{BB962C8B-B14F-4D97-AF65-F5344CB8AC3E}">
+        <p14:creationId xmlns:p14="http://schemas.microsoft.com/office/powerpoint/2010/main" val="2385370348"/>
+      </p:ext>
+    </p:extLst>
+  </p:cSld>
+  <p:clrMapOvr>
+    <a:masterClrMapping/>
+  </p:clrMapOvr>
+</p:notes>
+</file>
+
+<file path=ppt/notesSlides/notesSlide2.xml><?xml version="1.0" encoding="utf-8"?>
+<p:notes xmlns:a="http://schemas.openxmlformats.org/drawingml/2006/main" xmlns:r="http://schemas.openxmlformats.org/officeDocument/2006/relationships" xmlns:p="http://schemas.openxmlformats.org/presentationml/2006/main">
+  <p:cSld>
+    <p:spTree>
+      <p:nvGrpSpPr>
+        <p:cNvPr id="1" name=""/>
+        <p:cNvGrpSpPr/>
+        <p:nvPr/>
+      </p:nvGrpSpPr>
+      <p:grpSpPr>
+        <a:xfrm>
+          <a:off x="0" y="0"/>
+          <a:ext cx="0" cy="0"/>
+          <a:chOff x="0" y="0"/>
+          <a:chExt cx="0" cy="0"/>
+        </a:xfrm>
+      </p:grpSpPr>
+      <p:sp>
+        <p:nvSpPr>
+          <p:cNvPr id="2" name="Slide Image Placeholder 1"/>
+          <p:cNvSpPr>
+            <a:spLocks noGrp="1" noRot="1" noChangeAspect="1"/>
+          </p:cNvSpPr>
+          <p:nvPr>
+            <p:ph type="sldImg"/>
+          </p:nvPr>
+        </p:nvSpPr>
+        <p:spPr/>
+      </p:sp>
+      <p:sp>
+        <p:nvSpPr>
+          <p:cNvPr id="3" name="Notes Placeholder 2"/>
+          <p:cNvSpPr>
+            <a:spLocks noGrp="1"/>
+          </p:cNvSpPr>
+          <p:nvPr>
+            <p:ph type="body" idx="1"/>
+          </p:nvPr>
+        </p:nvSpPr>
+        <p:spPr/>
+        <p:txBody>
+          <a:bodyPr/>
+          <a:lstStyle/>
+          <a:p>
+            <a:r>
+              <a:rPr lang="en-US" dirty="0"/>
+              <a:t>Wanted the application to be simple enough to be appreciated</a:t>
+            </a:r>
+            <a:r>
+              <a:rPr lang="en-US" baseline="0" dirty="0"/>
+              <a:t> by everyone</a:t>
+            </a:r>
+          </a:p>
+          <a:p>
+            <a:r>
+              <a:rPr lang="en-US" baseline="0" dirty="0"/>
+              <a:t>But powerful enough to allow more experienced users to ask interesting questions</a:t>
+            </a:r>
+          </a:p>
+          <a:p>
+            <a:endParaRPr lang="en-US" baseline="0" dirty="0"/>
+          </a:p>
+          <a:p>
+            <a:r>
+              <a:rPr lang="en-US" baseline="0" dirty="0"/>
+              <a:t>Skip if taking too long</a:t>
+            </a:r>
+            <a:endParaRPr lang="en-US" dirty="0"/>
+          </a:p>
+        </p:txBody>
+      </p:sp>
+      <p:sp>
+        <p:nvSpPr>
+          <p:cNvPr id="4" name="Slide Number Placeholder 3"/>
+          <p:cNvSpPr>
+            <a:spLocks noGrp="1"/>
+          </p:cNvSpPr>
+          <p:nvPr>
+            <p:ph type="sldNum" sz="quarter" idx="10"/>
+          </p:nvPr>
+        </p:nvSpPr>
+        <p:spPr/>
+        <p:txBody>
+          <a:bodyPr/>
+          <a:lstStyle/>
+          <a:p>
+            <a:fld id="{0FB58104-7A71-4148-9C2F-5C9F9A601E34}" type="slidenum">
+              <a:rPr lang="en-US" smtClean="0"/>
+              <a:t>3</a:t>
+            </a:fld>
+            <a:endParaRPr lang="en-US"/>
+          </a:p>
+        </p:txBody>
+      </p:sp>
+    </p:spTree>
+    <p:extLst>
+      <p:ext uri="{BB962C8B-B14F-4D97-AF65-F5344CB8AC3E}">
+        <p14:creationId xmlns:p14="http://schemas.microsoft.com/office/powerpoint/2010/main" val="2294154972"/>
+      </p:ext>
+    </p:extLst>
+  </p:cSld>
+  <p:clrMapOvr>
+    <a:masterClrMapping/>
+  </p:clrMapOvr>
+</p:notes>
+</file>
+
+<file path=ppt/notesSlides/notesSlide3.xml><?xml version="1.0" encoding="utf-8"?>
+<p:notes xmlns:a="http://schemas.openxmlformats.org/drawingml/2006/main" xmlns:r="http://schemas.openxmlformats.org/officeDocument/2006/relationships" xmlns:p="http://schemas.openxmlformats.org/presentationml/2006/main">
+  <p:cSld>
+    <p:spTree>
+      <p:nvGrpSpPr>
+        <p:cNvPr id="1" name=""/>
+        <p:cNvGrpSpPr/>
+        <p:nvPr/>
+      </p:nvGrpSpPr>
+      <p:grpSpPr>
+        <a:xfrm>
+          <a:off x="0" y="0"/>
+          <a:ext cx="0" cy="0"/>
+          <a:chOff x="0" y="0"/>
+          <a:chExt cx="0" cy="0"/>
+        </a:xfrm>
+      </p:grpSpPr>
+      <p:sp>
+        <p:nvSpPr>
+          <p:cNvPr id="2" name="Slide Image Placeholder 1"/>
+          <p:cNvSpPr>
+            <a:spLocks noGrp="1" noRot="1" noChangeAspect="1"/>
+          </p:cNvSpPr>
+          <p:nvPr>
+            <p:ph type="sldImg"/>
+          </p:nvPr>
+        </p:nvSpPr>
+        <p:spPr/>
+      </p:sp>
+      <p:sp>
+        <p:nvSpPr>
+          <p:cNvPr id="3" name="Notes Placeholder 2"/>
+          <p:cNvSpPr>
+            <a:spLocks noGrp="1"/>
+          </p:cNvSpPr>
+          <p:nvPr>
+            <p:ph type="body" idx="1"/>
+          </p:nvPr>
+        </p:nvSpPr>
+        <p:spPr/>
+        <p:txBody>
+          <a:bodyPr/>
+          <a:lstStyle/>
+          <a:p>
+            <a:r>
+              <a:rPr lang="en-US" dirty="0"/>
+              <a:t>Dataset consists</a:t>
+            </a:r>
+            <a:r>
+              <a:rPr lang="en-US" baseline="0" dirty="0"/>
+              <a:t> of individual crime reportings within Chicago, Illinois</a:t>
+            </a:r>
+          </a:p>
+          <a:p>
+            <a:r>
+              <a:rPr lang="en-US" baseline="0" dirty="0"/>
+              <a:t>Each point of data represents a single crime, except homicides</a:t>
+            </a:r>
+            <a:endParaRPr lang="en-US" dirty="0"/>
+          </a:p>
+        </p:txBody>
+      </p:sp>
+      <p:sp>
+        <p:nvSpPr>
+          <p:cNvPr id="4" name="Slide Number Placeholder 3"/>
+          <p:cNvSpPr>
+            <a:spLocks noGrp="1"/>
+          </p:cNvSpPr>
+          <p:nvPr>
+            <p:ph type="sldNum" sz="quarter" idx="10"/>
+          </p:nvPr>
+        </p:nvSpPr>
+        <p:spPr/>
+        <p:txBody>
+          <a:bodyPr/>
+          <a:lstStyle/>
+          <a:p>
+            <a:fld id="{0FB58104-7A71-4148-9C2F-5C9F9A601E34}" type="slidenum">
+              <a:rPr lang="en-US" smtClean="0"/>
+              <a:t>4</a:t>
+            </a:fld>
+            <a:endParaRPr lang="en-US"/>
+          </a:p>
+        </p:txBody>
+      </p:sp>
+    </p:spTree>
+    <p:extLst>
+      <p:ext uri="{BB962C8B-B14F-4D97-AF65-F5344CB8AC3E}">
+        <p14:creationId xmlns:p14="http://schemas.microsoft.com/office/powerpoint/2010/main" val="1386846818"/>
+      </p:ext>
+    </p:extLst>
+  </p:cSld>
+  <p:clrMapOvr>
+    <a:masterClrMapping/>
+  </p:clrMapOvr>
+</p:notes>
+</file>
+
+<file path=ppt/notesSlides/notesSlide4.xml><?xml version="1.0" encoding="utf-8"?>
+<p:notes xmlns:a="http://schemas.openxmlformats.org/drawingml/2006/main" xmlns:r="http://schemas.openxmlformats.org/officeDocument/2006/relationships" xmlns:p="http://schemas.openxmlformats.org/presentationml/2006/main">
+  <p:cSld>
+    <p:spTree>
+      <p:nvGrpSpPr>
+        <p:cNvPr id="1" name=""/>
+        <p:cNvGrpSpPr/>
+        <p:nvPr/>
+      </p:nvGrpSpPr>
+      <p:grpSpPr>
+        <a:xfrm>
+          <a:off x="0" y="0"/>
+          <a:ext cx="0" cy="0"/>
+          <a:chOff x="0" y="0"/>
+          <a:chExt cx="0" cy="0"/>
+        </a:xfrm>
+      </p:grpSpPr>
+      <p:sp>
+        <p:nvSpPr>
+          <p:cNvPr id="2" name="Slide Image Placeholder 1"/>
+          <p:cNvSpPr>
+            <a:spLocks noGrp="1" noRot="1" noChangeAspect="1"/>
+          </p:cNvSpPr>
+          <p:nvPr>
+            <p:ph type="sldImg"/>
+          </p:nvPr>
+        </p:nvSpPr>
+        <p:spPr/>
+      </p:sp>
+      <p:sp>
+        <p:nvSpPr>
+          <p:cNvPr id="3" name="Notes Placeholder 2"/>
+          <p:cNvSpPr>
+            <a:spLocks noGrp="1"/>
+          </p:cNvSpPr>
+          <p:nvPr>
+            <p:ph type="body" idx="1"/>
+          </p:nvPr>
+        </p:nvSpPr>
+        <p:spPr/>
+        <p:txBody>
+          <a:bodyPr/>
+          <a:lstStyle/>
+          <a:p>
+            <a:r>
+              <a:rPr lang="en-US" dirty="0"/>
+              <a:t>Do the demo here</a:t>
+            </a:r>
+          </a:p>
+          <a:p>
+            <a:endParaRPr lang="en-US" dirty="0"/>
+          </a:p>
+          <a:p>
+            <a:r>
+              <a:rPr lang="en-US" dirty="0"/>
+              <a:t>4 minutes</a:t>
+            </a:r>
+          </a:p>
+        </p:txBody>
+      </p:sp>
+      <p:sp>
+        <p:nvSpPr>
+          <p:cNvPr id="4" name="Slide Number Placeholder 3"/>
+          <p:cNvSpPr>
+            <a:spLocks noGrp="1"/>
+          </p:cNvSpPr>
+          <p:nvPr>
+            <p:ph type="sldNum" sz="quarter" idx="10"/>
+          </p:nvPr>
+        </p:nvSpPr>
+        <p:spPr/>
+        <p:txBody>
+          <a:bodyPr/>
+          <a:lstStyle/>
+          <a:p>
+            <a:fld id="{0FB58104-7A71-4148-9C2F-5C9F9A601E34}" type="slidenum">
+              <a:rPr lang="en-US" smtClean="0"/>
+              <a:t>5</a:t>
+            </a:fld>
+            <a:endParaRPr lang="en-US"/>
+          </a:p>
+        </p:txBody>
+      </p:sp>
+    </p:spTree>
+    <p:extLst>
+      <p:ext uri="{BB962C8B-B14F-4D97-AF65-F5344CB8AC3E}">
+        <p14:creationId xmlns:p14="http://schemas.microsoft.com/office/powerpoint/2010/main" val="3006235561"/>
+      </p:ext>
+    </p:extLst>
+  </p:cSld>
+  <p:clrMapOvr>
+    <a:masterClrMapping/>
+  </p:clrMapOvr>
+</p:notes>
+</file>
+
+<file path=ppt/notesSlides/notesSlide5.xml><?xml version="1.0" encoding="utf-8"?>
+<p:notes xmlns:a="http://schemas.openxmlformats.org/drawingml/2006/main" xmlns:r="http://schemas.openxmlformats.org/officeDocument/2006/relationships" xmlns:p="http://schemas.openxmlformats.org/presentationml/2006/main">
+  <p:cSld>
+    <p:spTree>
+      <p:nvGrpSpPr>
+        <p:cNvPr id="1" name=""/>
+        <p:cNvGrpSpPr/>
+        <p:nvPr/>
+      </p:nvGrpSpPr>
+      <p:grpSpPr>
+        <a:xfrm>
+          <a:off x="0" y="0"/>
+          <a:ext cx="0" cy="0"/>
+          <a:chOff x="0" y="0"/>
+          <a:chExt cx="0" cy="0"/>
+        </a:xfrm>
+      </p:grpSpPr>
+      <p:sp>
+        <p:nvSpPr>
+          <p:cNvPr id="2" name="Slide Image Placeholder 1"/>
+          <p:cNvSpPr>
+            <a:spLocks noGrp="1" noRot="1" noChangeAspect="1"/>
+          </p:cNvSpPr>
+          <p:nvPr>
+            <p:ph type="sldImg"/>
+          </p:nvPr>
+        </p:nvSpPr>
+        <p:spPr/>
+      </p:sp>
+      <p:sp>
+        <p:nvSpPr>
+          <p:cNvPr id="3" name="Notes Placeholder 2"/>
+          <p:cNvSpPr>
+            <a:spLocks noGrp="1"/>
+          </p:cNvSpPr>
+          <p:nvPr>
+            <p:ph type="body" idx="1"/>
+          </p:nvPr>
+        </p:nvSpPr>
+        <p:spPr/>
+        <p:txBody>
+          <a:bodyPr/>
+          <a:lstStyle/>
+          <a:p>
+            <a:r>
+              <a:rPr lang="en-US" dirty="0"/>
+              <a:t>9 minutes</a:t>
+            </a:r>
+          </a:p>
+        </p:txBody>
+      </p:sp>
+      <p:sp>
+        <p:nvSpPr>
+          <p:cNvPr id="4" name="Slide Number Placeholder 3"/>
+          <p:cNvSpPr>
+            <a:spLocks noGrp="1"/>
+          </p:cNvSpPr>
+          <p:nvPr>
+            <p:ph type="sldNum" sz="quarter" idx="10"/>
+          </p:nvPr>
+        </p:nvSpPr>
+        <p:spPr/>
+        <p:txBody>
+          <a:bodyPr/>
+          <a:lstStyle/>
+          <a:p>
+            <a:fld id="{0FB58104-7A71-4148-9C2F-5C9F9A601E34}" type="slidenum">
+              <a:rPr lang="en-US" smtClean="0"/>
+              <a:t>17</a:t>
+            </a:fld>
+            <a:endParaRPr lang="en-US"/>
+          </a:p>
+        </p:txBody>
+      </p:sp>
+    </p:spTree>
+    <p:extLst>
+      <p:ext uri="{BB962C8B-B14F-4D97-AF65-F5344CB8AC3E}">
+        <p14:creationId xmlns:p14="http://schemas.microsoft.com/office/powerpoint/2010/main" val="3656346275"/>
+      </p:ext>
+    </p:extLst>
+  </p:cSld>
+  <p:clrMapOvr>
+    <a:masterClrMapping/>
+  </p:clrMapOvr>
+</p:notes>
+</file>
+
+<file path=ppt/notesSlides/notesSlide6.xml><?xml version="1.0" encoding="utf-8"?>
+<p:notes xmlns:a="http://schemas.openxmlformats.org/drawingml/2006/main" xmlns:r="http://schemas.openxmlformats.org/officeDocument/2006/relationships" xmlns:p="http://schemas.openxmlformats.org/presentationml/2006/main">
+  <p:cSld>
+    <p:spTree>
+      <p:nvGrpSpPr>
+        <p:cNvPr id="1" name=""/>
+        <p:cNvGrpSpPr/>
+        <p:nvPr/>
+      </p:nvGrpSpPr>
+      <p:grpSpPr>
+        <a:xfrm>
+          <a:off x="0" y="0"/>
+          <a:ext cx="0" cy="0"/>
+          <a:chOff x="0" y="0"/>
+          <a:chExt cx="0" cy="0"/>
+        </a:xfrm>
+      </p:grpSpPr>
+      <p:sp>
+        <p:nvSpPr>
+          <p:cNvPr id="2" name="Slide Image Placeholder 1"/>
+          <p:cNvSpPr>
+            <a:spLocks noGrp="1" noRot="1" noChangeAspect="1"/>
+          </p:cNvSpPr>
+          <p:nvPr>
+            <p:ph type="sldImg"/>
+          </p:nvPr>
+        </p:nvSpPr>
+        <p:spPr/>
+      </p:sp>
+      <p:sp>
+        <p:nvSpPr>
+          <p:cNvPr id="3" name="Notes Placeholder 2"/>
+          <p:cNvSpPr>
+            <a:spLocks noGrp="1"/>
+          </p:cNvSpPr>
+          <p:nvPr>
+            <p:ph type="body" idx="1"/>
+          </p:nvPr>
+        </p:nvSpPr>
+        <p:spPr/>
+        <p:txBody>
+          <a:bodyPr/>
+          <a:lstStyle/>
+          <a:p>
+            <a:r>
+              <a:rPr lang="en-US" dirty="0"/>
+              <a:t>Skip if taking too long (around 10 minutes)</a:t>
+            </a:r>
+          </a:p>
+        </p:txBody>
+      </p:sp>
+      <p:sp>
+        <p:nvSpPr>
+          <p:cNvPr id="4" name="Slide Number Placeholder 3"/>
+          <p:cNvSpPr>
+            <a:spLocks noGrp="1"/>
+          </p:cNvSpPr>
+          <p:nvPr>
+            <p:ph type="sldNum" sz="quarter" idx="10"/>
+          </p:nvPr>
+        </p:nvSpPr>
+        <p:spPr/>
+        <p:txBody>
+          <a:bodyPr/>
+          <a:lstStyle/>
+          <a:p>
+            <a:fld id="{0FB58104-7A71-4148-9C2F-5C9F9A601E34}" type="slidenum">
+              <a:rPr lang="en-US" smtClean="0"/>
+              <a:t>19</a:t>
+            </a:fld>
+            <a:endParaRPr lang="en-US"/>
+          </a:p>
+        </p:txBody>
+      </p:sp>
+    </p:spTree>
+    <p:extLst>
+      <p:ext uri="{BB962C8B-B14F-4D97-AF65-F5344CB8AC3E}">
+        <p14:creationId xmlns:p14="http://schemas.microsoft.com/office/powerpoint/2010/main" val="2133007388"/>
+      </p:ext>
+    </p:extLst>
+  </p:cSld>
+  <p:clrMapOvr>
+    <a:masterClrMapping/>
+  </p:clrMapOvr>
+</p:notes>
+</file>
+
+<file path=ppt/notesSlides/notesSlide7.xml><?xml version="1.0" encoding="utf-8"?>
+<p:notes xmlns:a="http://schemas.openxmlformats.org/drawingml/2006/main" xmlns:r="http://schemas.openxmlformats.org/officeDocument/2006/relationships" xmlns:p="http://schemas.openxmlformats.org/presentationml/2006/main">
+  <p:cSld>
+    <p:spTree>
+      <p:nvGrpSpPr>
+        <p:cNvPr id="1" name=""/>
+        <p:cNvGrpSpPr/>
+        <p:nvPr/>
+      </p:nvGrpSpPr>
+      <p:grpSpPr>
+        <a:xfrm>
+          <a:off x="0" y="0"/>
+          <a:ext cx="0" cy="0"/>
+          <a:chOff x="0" y="0"/>
+          <a:chExt cx="0" cy="0"/>
+        </a:xfrm>
+      </p:grpSpPr>
+      <p:sp>
+        <p:nvSpPr>
+          <p:cNvPr id="2" name="Slide Image Placeholder 1"/>
+          <p:cNvSpPr>
+            <a:spLocks noGrp="1" noRot="1" noChangeAspect="1"/>
+          </p:cNvSpPr>
+          <p:nvPr>
+            <p:ph type="sldImg"/>
+          </p:nvPr>
+        </p:nvSpPr>
+        <p:spPr/>
+      </p:sp>
+      <p:sp>
+        <p:nvSpPr>
+          <p:cNvPr id="3" name="Notes Placeholder 2"/>
+          <p:cNvSpPr>
+            <a:spLocks noGrp="1"/>
+          </p:cNvSpPr>
+          <p:nvPr>
+            <p:ph type="body" idx="1"/>
+          </p:nvPr>
+        </p:nvSpPr>
+        <p:spPr/>
+        <p:txBody>
+          <a:bodyPr/>
+          <a:lstStyle/>
+          <a:p>
+            <a:r>
+              <a:rPr lang="en-US" dirty="0"/>
+              <a:t>10 minutes</a:t>
+            </a:r>
+          </a:p>
+        </p:txBody>
+      </p:sp>
+      <p:sp>
+        <p:nvSpPr>
+          <p:cNvPr id="4" name="Slide Number Placeholder 3"/>
+          <p:cNvSpPr>
+            <a:spLocks noGrp="1"/>
+          </p:cNvSpPr>
+          <p:nvPr>
+            <p:ph type="sldNum" sz="quarter" idx="10"/>
+          </p:nvPr>
+        </p:nvSpPr>
+        <p:spPr/>
+        <p:txBody>
+          <a:bodyPr/>
+          <a:lstStyle/>
+          <a:p>
+            <a:fld id="{0FB58104-7A71-4148-9C2F-5C9F9A601E34}" type="slidenum">
+              <a:rPr lang="en-US" smtClean="0"/>
+              <a:t>21</a:t>
+            </a:fld>
+            <a:endParaRPr lang="en-US"/>
+          </a:p>
+        </p:txBody>
+      </p:sp>
+    </p:spTree>
+    <p:extLst>
+      <p:ext uri="{BB962C8B-B14F-4D97-AF65-F5344CB8AC3E}">
+        <p14:creationId xmlns:p14="http://schemas.microsoft.com/office/powerpoint/2010/main" val="1813737472"/>
+      </p:ext>
+    </p:extLst>
+  </p:cSld>
+  <p:clrMapOvr>
+    <a:masterClrMapping/>
+  </p:clrMapOvr>
+</p:notes>
+</file>
+
+<file path=ppt/notesSlides/notesSlide8.xml><?xml version="1.0" encoding="utf-8"?>
+<p:notes xmlns:a="http://schemas.openxmlformats.org/drawingml/2006/main" xmlns:r="http://schemas.openxmlformats.org/officeDocument/2006/relationships" xmlns:p="http://schemas.openxmlformats.org/presentationml/2006/main">
+  <p:cSld>
+    <p:spTree>
+      <p:nvGrpSpPr>
+        <p:cNvPr id="1" name=""/>
+        <p:cNvGrpSpPr/>
+        <p:nvPr/>
+      </p:nvGrpSpPr>
+      <p:grpSpPr>
+        <a:xfrm>
+          <a:off x="0" y="0"/>
+          <a:ext cx="0" cy="0"/>
+          <a:chOff x="0" y="0"/>
+          <a:chExt cx="0" cy="0"/>
+        </a:xfrm>
+      </p:grpSpPr>
+      <p:sp>
+        <p:nvSpPr>
+          <p:cNvPr id="2" name="Slide Image Placeholder 1"/>
+          <p:cNvSpPr>
+            <a:spLocks noGrp="1" noRot="1" noChangeAspect="1"/>
+          </p:cNvSpPr>
+          <p:nvPr>
+            <p:ph type="sldImg"/>
+          </p:nvPr>
+        </p:nvSpPr>
+        <p:spPr/>
+      </p:sp>
+      <p:sp>
+        <p:nvSpPr>
+          <p:cNvPr id="3" name="Notes Placeholder 2"/>
+          <p:cNvSpPr>
+            <a:spLocks noGrp="1"/>
+          </p:cNvSpPr>
+          <p:nvPr>
+            <p:ph type="body" idx="1"/>
+          </p:nvPr>
+        </p:nvSpPr>
+        <p:spPr/>
+        <p:txBody>
+          <a:bodyPr/>
+          <a:lstStyle/>
+          <a:p>
+            <a:r>
+              <a:rPr lang="en-US" dirty="0"/>
+              <a:t>In order to achieve such a varied application, I had to make use of a good number of software packages</a:t>
+            </a:r>
+          </a:p>
+          <a:p>
+            <a:r>
+              <a:rPr lang="en-US" dirty="0"/>
+              <a:t>Had to use a server to offload some of the work from the client,</a:t>
+            </a:r>
+            <a:r>
+              <a:rPr lang="en-US" baseline="0" dirty="0"/>
+              <a:t> just loading from disk was very slow</a:t>
+            </a:r>
+          </a:p>
+          <a:p>
+            <a:r>
+              <a:rPr lang="en-US" baseline="0" dirty="0"/>
+              <a:t>I had to be choosy of what I wanted to show, the user has to be choosy about what they want to see</a:t>
+            </a:r>
+          </a:p>
+          <a:p>
+            <a:r>
+              <a:rPr lang="en-US" baseline="0" dirty="0"/>
+              <a:t>With so many different aspects of the data, different views allow for separating and focusing user attention</a:t>
+            </a:r>
+            <a:endParaRPr lang="en-US" dirty="0"/>
+          </a:p>
+        </p:txBody>
+      </p:sp>
+      <p:sp>
+        <p:nvSpPr>
+          <p:cNvPr id="4" name="Slide Number Placeholder 3"/>
+          <p:cNvSpPr>
+            <a:spLocks noGrp="1"/>
+          </p:cNvSpPr>
+          <p:nvPr>
+            <p:ph type="sldNum" sz="quarter" idx="10"/>
+          </p:nvPr>
+        </p:nvSpPr>
+        <p:spPr/>
+        <p:txBody>
+          <a:bodyPr/>
+          <a:lstStyle/>
+          <a:p>
+            <a:fld id="{0FB58104-7A71-4148-9C2F-5C9F9A601E34}" type="slidenum">
+              <a:rPr lang="en-US" smtClean="0"/>
+              <a:t>24</a:t>
+            </a:fld>
+            <a:endParaRPr lang="en-US"/>
+          </a:p>
+        </p:txBody>
+      </p:sp>
+    </p:spTree>
+    <p:extLst>
+      <p:ext uri="{BB962C8B-B14F-4D97-AF65-F5344CB8AC3E}">
+        <p14:creationId xmlns:p14="http://schemas.microsoft.com/office/powerpoint/2010/main" val="2436620667"/>
+      </p:ext>
+    </p:extLst>
+  </p:cSld>
+  <p:clrMapOvr>
+    <a:masterClrMapping/>
+  </p:clrMapOvr>
+</p:notes>
+</file>
+
 <file path=ppt/slideLayouts/slideLayout1.xml><?xml version="1.0" encoding="utf-8"?>
 <p:sldLayout xmlns:a="http://schemas.openxmlformats.org/drawingml/2006/main" xmlns:r="http://schemas.openxmlformats.org/officeDocument/2006/relationships" xmlns:p="http://schemas.openxmlformats.org/presentationml/2006/main" showMasterSp="0" type="title" preserve="1">
   <p:cSld name="Title Slide">
@@ -362,7 +1509,7 @@
           <a:p>
             <a:fld id="{535338A9-823C-4017-921A-4A04FE41E844}" type="datetimeFigureOut">
               <a:rPr lang="en-US" smtClean="0"/>
-              <a:t>12/13/2016</a:t>
+              <a:t>12/15/2016</a:t>
             </a:fld>
             <a:endParaRPr lang="en-US"/>
           </a:p>
@@ -570,7 +1717,7 @@
           <a:p>
             <a:fld id="{535338A9-823C-4017-921A-4A04FE41E844}" type="datetimeFigureOut">
               <a:rPr lang="en-US" smtClean="0"/>
-              <a:t>12/13/2016</a:t>
+              <a:t>12/15/2016</a:t>
             </a:fld>
             <a:endParaRPr lang="en-US"/>
           </a:p>
@@ -826,7 +1973,7 @@
           <a:p>
             <a:fld id="{535338A9-823C-4017-921A-4A04FE41E844}" type="datetimeFigureOut">
               <a:rPr lang="en-US" smtClean="0"/>
-              <a:t>12/13/2016</a:t>
+              <a:t>12/15/2016</a:t>
             </a:fld>
             <a:endParaRPr lang="en-US"/>
           </a:p>
@@ -1000,7 +2147,7 @@
           <a:p>
             <a:fld id="{535338A9-823C-4017-921A-4A04FE41E844}" type="datetimeFigureOut">
               <a:rPr lang="en-US" smtClean="0"/>
-              <a:t>12/13/2016</a:t>
+              <a:t>12/15/2016</a:t>
             </a:fld>
             <a:endParaRPr lang="en-US"/>
           </a:p>
@@ -1343,7 +2490,7 @@
           <a:p>
             <a:fld id="{535338A9-823C-4017-921A-4A04FE41E844}" type="datetimeFigureOut">
               <a:rPr lang="en-US" smtClean="0"/>
-              <a:t>12/13/2016</a:t>
+              <a:t>12/15/2016</a:t>
             </a:fld>
             <a:endParaRPr lang="en-US"/>
           </a:p>
@@ -1618,7 +2765,7 @@
           <a:p>
             <a:fld id="{535338A9-823C-4017-921A-4A04FE41E844}" type="datetimeFigureOut">
               <a:rPr lang="en-US" smtClean="0"/>
-              <a:t>12/13/2016</a:t>
+              <a:t>12/15/2016</a:t>
             </a:fld>
             <a:endParaRPr lang="en-US"/>
           </a:p>
@@ -1997,7 +3144,7 @@
           <a:p>
             <a:fld id="{535338A9-823C-4017-921A-4A04FE41E844}" type="datetimeFigureOut">
               <a:rPr lang="en-US" smtClean="0"/>
-              <a:t>12/13/2016</a:t>
+              <a:t>12/15/2016</a:t>
             </a:fld>
             <a:endParaRPr lang="en-US"/>
           </a:p>
@@ -2115,7 +3262,7 @@
           <a:p>
             <a:fld id="{535338A9-823C-4017-921A-4A04FE41E844}" type="datetimeFigureOut">
               <a:rPr lang="en-US" smtClean="0"/>
-              <a:t>12/13/2016</a:t>
+              <a:t>12/15/2016</a:t>
             </a:fld>
             <a:endParaRPr lang="en-US"/>
           </a:p>
@@ -2286,7 +3433,7 @@
           <a:p>
             <a:fld id="{535338A9-823C-4017-921A-4A04FE41E844}" type="datetimeFigureOut">
               <a:rPr lang="en-US" smtClean="0"/>
-              <a:t>12/13/2016</a:t>
+              <a:t>12/15/2016</a:t>
             </a:fld>
             <a:endParaRPr lang="en-US"/>
           </a:p>
@@ -2640,7 +3787,7 @@
           <a:p>
             <a:fld id="{535338A9-823C-4017-921A-4A04FE41E844}" type="datetimeFigureOut">
               <a:rPr lang="en-US" smtClean="0"/>
-              <a:t>12/13/2016</a:t>
+              <a:t>12/15/2016</a:t>
             </a:fld>
             <a:endParaRPr lang="en-US"/>
           </a:p>
@@ -3022,7 +4169,7 @@
           <a:p>
             <a:fld id="{535338A9-823C-4017-921A-4A04FE41E844}" type="datetimeFigureOut">
               <a:rPr lang="en-US" smtClean="0"/>
-              <a:t>12/13/2016</a:t>
+              <a:t>12/15/2016</a:t>
             </a:fld>
             <a:endParaRPr lang="en-US"/>
           </a:p>
@@ -3309,7 +4456,7 @@
           <a:p>
             <a:fld id="{535338A9-823C-4017-921A-4A04FE41E844}" type="datetimeFigureOut">
               <a:rPr lang="en-US" smtClean="0"/>
-              <a:t>12/13/2016</a:t>
+              <a:t>12/15/2016</a:t>
             </a:fld>
             <a:endParaRPr lang="en-US"/>
           </a:p>
@@ -3907,6 +5054,65 @@
           <a:chExt cx="0" cy="0"/>
         </a:xfrm>
       </p:grpSpPr>
+      <p:pic>
+        <p:nvPicPr>
+          <p:cNvPr id="4" name="Content Placeholder 3"/>
+          <p:cNvPicPr>
+            <a:picLocks noGrp="1" noChangeAspect="1"/>
+          </p:cNvPicPr>
+          <p:nvPr>
+            <p:ph idx="1"/>
+          </p:nvPr>
+        </p:nvPicPr>
+        <p:blipFill>
+          <a:blip r:embed="rId2">
+            <a:extLst>
+              <a:ext uri="{28A0092B-C50C-407E-A947-70E740481C1C}">
+                <a14:useLocalDpi xmlns:a14="http://schemas.microsoft.com/office/drawing/2010/main" val="0"/>
+              </a:ext>
+            </a:extLst>
+          </a:blip>
+          <a:stretch>
+            <a:fillRect/>
+          </a:stretch>
+        </p:blipFill>
+        <p:spPr>
+          <a:xfrm>
+            <a:off x="0" y="0"/>
+            <a:ext cx="12192000" cy="6858000"/>
+          </a:xfrm>
+        </p:spPr>
+      </p:pic>
+    </p:spTree>
+    <p:extLst>
+      <p:ext uri="{BB962C8B-B14F-4D97-AF65-F5344CB8AC3E}">
+        <p14:creationId xmlns:p14="http://schemas.microsoft.com/office/powerpoint/2010/main" val="3462182744"/>
+      </p:ext>
+    </p:extLst>
+  </p:cSld>
+  <p:clrMapOvr>
+    <a:masterClrMapping/>
+  </p:clrMapOvr>
+</p:sld>
+</file>
+
+<file path=ppt/slides/slide11.xml><?xml version="1.0" encoding="utf-8"?>
+<p:sld xmlns:a="http://schemas.openxmlformats.org/drawingml/2006/main" xmlns:r="http://schemas.openxmlformats.org/officeDocument/2006/relationships" xmlns:p="http://schemas.openxmlformats.org/presentationml/2006/main">
+  <p:cSld>
+    <p:spTree>
+      <p:nvGrpSpPr>
+        <p:cNvPr id="1" name=""/>
+        <p:cNvGrpSpPr/>
+        <p:nvPr/>
+      </p:nvGrpSpPr>
+      <p:grpSpPr>
+        <a:xfrm>
+          <a:off x="0" y="0"/>
+          <a:ext cx="0" cy="0"/>
+          <a:chOff x="0" y="0"/>
+          <a:chExt cx="0" cy="0"/>
+        </a:xfrm>
+      </p:grpSpPr>
       <p:sp>
         <p:nvSpPr>
           <p:cNvPr id="2" name="Title 1"/>
@@ -3924,7 +5130,570 @@
           <a:p>
             <a:r>
               <a:rPr lang="en-US" dirty="0"/>
-              <a:t>Application Layout</a:t>
+              <a:t>View 2: Table</a:t>
+            </a:r>
+          </a:p>
+        </p:txBody>
+      </p:sp>
+    </p:spTree>
+    <p:extLst>
+      <p:ext uri="{BB962C8B-B14F-4D97-AF65-F5344CB8AC3E}">
+        <p14:creationId xmlns:p14="http://schemas.microsoft.com/office/powerpoint/2010/main" val="4241321684"/>
+      </p:ext>
+    </p:extLst>
+  </p:cSld>
+  <p:clrMapOvr>
+    <a:masterClrMapping/>
+  </p:clrMapOvr>
+</p:sld>
+</file>
+
+<file path=ppt/slides/slide12.xml><?xml version="1.0" encoding="utf-8"?>
+<p:sld xmlns:a="http://schemas.openxmlformats.org/drawingml/2006/main" xmlns:r="http://schemas.openxmlformats.org/officeDocument/2006/relationships" xmlns:p="http://schemas.openxmlformats.org/presentationml/2006/main">
+  <p:cSld>
+    <p:spTree>
+      <p:nvGrpSpPr>
+        <p:cNvPr id="1" name=""/>
+        <p:cNvGrpSpPr/>
+        <p:nvPr/>
+      </p:nvGrpSpPr>
+      <p:grpSpPr>
+        <a:xfrm>
+          <a:off x="0" y="0"/>
+          <a:ext cx="0" cy="0"/>
+          <a:chOff x="0" y="0"/>
+          <a:chExt cx="0" cy="0"/>
+        </a:xfrm>
+      </p:grpSpPr>
+      <p:pic>
+        <p:nvPicPr>
+          <p:cNvPr id="4" name="Content Placeholder 3"/>
+          <p:cNvPicPr>
+            <a:picLocks noGrp="1" noChangeAspect="1"/>
+          </p:cNvPicPr>
+          <p:nvPr>
+            <p:ph idx="1"/>
+          </p:nvPr>
+        </p:nvPicPr>
+        <p:blipFill>
+          <a:blip r:embed="rId2">
+            <a:extLst>
+              <a:ext uri="{28A0092B-C50C-407E-A947-70E740481C1C}">
+                <a14:useLocalDpi xmlns:a14="http://schemas.microsoft.com/office/drawing/2010/main" val="0"/>
+              </a:ext>
+            </a:extLst>
+          </a:blip>
+          <a:stretch>
+            <a:fillRect/>
+          </a:stretch>
+        </p:blipFill>
+        <p:spPr>
+          <a:xfrm>
+            <a:off x="0" y="-1"/>
+            <a:ext cx="12170893" cy="6858001"/>
+          </a:xfrm>
+        </p:spPr>
+      </p:pic>
+    </p:spTree>
+    <p:extLst>
+      <p:ext uri="{BB962C8B-B14F-4D97-AF65-F5344CB8AC3E}">
+        <p14:creationId xmlns:p14="http://schemas.microsoft.com/office/powerpoint/2010/main" val="1720449951"/>
+      </p:ext>
+    </p:extLst>
+  </p:cSld>
+  <p:clrMapOvr>
+    <a:masterClrMapping/>
+  </p:clrMapOvr>
+</p:sld>
+</file>
+
+<file path=ppt/slides/slide13.xml><?xml version="1.0" encoding="utf-8"?>
+<p:sld xmlns:a="http://schemas.openxmlformats.org/drawingml/2006/main" xmlns:r="http://schemas.openxmlformats.org/officeDocument/2006/relationships" xmlns:p="http://schemas.openxmlformats.org/presentationml/2006/main">
+  <p:cSld>
+    <p:spTree>
+      <p:nvGrpSpPr>
+        <p:cNvPr id="1" name=""/>
+        <p:cNvGrpSpPr/>
+        <p:nvPr/>
+      </p:nvGrpSpPr>
+      <p:grpSpPr>
+        <a:xfrm>
+          <a:off x="0" y="0"/>
+          <a:ext cx="0" cy="0"/>
+          <a:chOff x="0" y="0"/>
+          <a:chExt cx="0" cy="0"/>
+        </a:xfrm>
+      </p:grpSpPr>
+      <p:sp>
+        <p:nvSpPr>
+          <p:cNvPr id="2" name="Title 1"/>
+          <p:cNvSpPr>
+            <a:spLocks noGrp="1"/>
+          </p:cNvSpPr>
+          <p:nvPr>
+            <p:ph type="title"/>
+          </p:nvPr>
+        </p:nvSpPr>
+        <p:spPr/>
+        <p:txBody>
+          <a:bodyPr/>
+          <a:lstStyle/>
+          <a:p>
+            <a:r>
+              <a:rPr lang="en-US" dirty="0"/>
+              <a:t>View 3: </a:t>
+            </a:r>
+            <a:r>
+              <a:rPr lang="en-US" dirty="0" err="1"/>
+              <a:t>Heatmap</a:t>
+            </a:r>
+            <a:endParaRPr lang="en-US" dirty="0"/>
+          </a:p>
+        </p:txBody>
+      </p:sp>
+    </p:spTree>
+    <p:extLst>
+      <p:ext uri="{BB962C8B-B14F-4D97-AF65-F5344CB8AC3E}">
+        <p14:creationId xmlns:p14="http://schemas.microsoft.com/office/powerpoint/2010/main" val="3575549951"/>
+      </p:ext>
+    </p:extLst>
+  </p:cSld>
+  <p:clrMapOvr>
+    <a:masterClrMapping/>
+  </p:clrMapOvr>
+</p:sld>
+</file>
+
+<file path=ppt/slides/slide14.xml><?xml version="1.0" encoding="utf-8"?>
+<p:sld xmlns:a="http://schemas.openxmlformats.org/drawingml/2006/main" xmlns:r="http://schemas.openxmlformats.org/officeDocument/2006/relationships" xmlns:p="http://schemas.openxmlformats.org/presentationml/2006/main">
+  <p:cSld>
+    <p:spTree>
+      <p:nvGrpSpPr>
+        <p:cNvPr id="1" name=""/>
+        <p:cNvGrpSpPr/>
+        <p:nvPr/>
+      </p:nvGrpSpPr>
+      <p:grpSpPr>
+        <a:xfrm>
+          <a:off x="0" y="0"/>
+          <a:ext cx="0" cy="0"/>
+          <a:chOff x="0" y="0"/>
+          <a:chExt cx="0" cy="0"/>
+        </a:xfrm>
+      </p:grpSpPr>
+      <p:pic>
+        <p:nvPicPr>
+          <p:cNvPr id="4" name="Content Placeholder 3"/>
+          <p:cNvPicPr>
+            <a:picLocks noGrp="1" noChangeAspect="1"/>
+          </p:cNvPicPr>
+          <p:nvPr>
+            <p:ph idx="1"/>
+          </p:nvPr>
+        </p:nvPicPr>
+        <p:blipFill>
+          <a:blip r:embed="rId2">
+            <a:extLst>
+              <a:ext uri="{28A0092B-C50C-407E-A947-70E740481C1C}">
+                <a14:useLocalDpi xmlns:a14="http://schemas.microsoft.com/office/drawing/2010/main" val="0"/>
+              </a:ext>
+            </a:extLst>
+          </a:blip>
+          <a:stretch>
+            <a:fillRect/>
+          </a:stretch>
+        </p:blipFill>
+        <p:spPr>
+          <a:xfrm>
+            <a:off x="1" y="0"/>
+            <a:ext cx="12192000" cy="6870149"/>
+          </a:xfrm>
+        </p:spPr>
+      </p:pic>
+    </p:spTree>
+    <p:extLst>
+      <p:ext uri="{BB962C8B-B14F-4D97-AF65-F5344CB8AC3E}">
+        <p14:creationId xmlns:p14="http://schemas.microsoft.com/office/powerpoint/2010/main" val="590599887"/>
+      </p:ext>
+    </p:extLst>
+  </p:cSld>
+  <p:clrMapOvr>
+    <a:masterClrMapping/>
+  </p:clrMapOvr>
+</p:sld>
+</file>
+
+<file path=ppt/slides/slide15.xml><?xml version="1.0" encoding="utf-8"?>
+<p:sld xmlns:a="http://schemas.openxmlformats.org/drawingml/2006/main" xmlns:r="http://schemas.openxmlformats.org/officeDocument/2006/relationships" xmlns:p="http://schemas.openxmlformats.org/presentationml/2006/main">
+  <p:cSld>
+    <p:spTree>
+      <p:nvGrpSpPr>
+        <p:cNvPr id="1" name=""/>
+        <p:cNvGrpSpPr/>
+        <p:nvPr/>
+      </p:nvGrpSpPr>
+      <p:grpSpPr>
+        <a:xfrm>
+          <a:off x="0" y="0"/>
+          <a:ext cx="0" cy="0"/>
+          <a:chOff x="0" y="0"/>
+          <a:chExt cx="0" cy="0"/>
+        </a:xfrm>
+      </p:grpSpPr>
+      <p:sp>
+        <p:nvSpPr>
+          <p:cNvPr id="2" name="Title 1"/>
+          <p:cNvSpPr>
+            <a:spLocks noGrp="1"/>
+          </p:cNvSpPr>
+          <p:nvPr>
+            <p:ph type="title"/>
+          </p:nvPr>
+        </p:nvSpPr>
+        <p:spPr/>
+        <p:txBody>
+          <a:bodyPr/>
+          <a:lstStyle/>
+          <a:p>
+            <a:r>
+              <a:rPr lang="en-US" dirty="0"/>
+              <a:t>View 4: </a:t>
+            </a:r>
+            <a:r>
+              <a:rPr lang="en-US" dirty="0" err="1"/>
+              <a:t>Bargraph</a:t>
+            </a:r>
+            <a:endParaRPr lang="en-US" dirty="0"/>
+          </a:p>
+        </p:txBody>
+      </p:sp>
+    </p:spTree>
+    <p:extLst>
+      <p:ext uri="{BB962C8B-B14F-4D97-AF65-F5344CB8AC3E}">
+        <p14:creationId xmlns:p14="http://schemas.microsoft.com/office/powerpoint/2010/main" val="2541222981"/>
+      </p:ext>
+    </p:extLst>
+  </p:cSld>
+  <p:clrMapOvr>
+    <a:masterClrMapping/>
+  </p:clrMapOvr>
+</p:sld>
+</file>
+
+<file path=ppt/slides/slide16.xml><?xml version="1.0" encoding="utf-8"?>
+<p:sld xmlns:a="http://schemas.openxmlformats.org/drawingml/2006/main" xmlns:r="http://schemas.openxmlformats.org/officeDocument/2006/relationships" xmlns:p="http://schemas.openxmlformats.org/presentationml/2006/main">
+  <p:cSld>
+    <p:spTree>
+      <p:nvGrpSpPr>
+        <p:cNvPr id="1" name=""/>
+        <p:cNvGrpSpPr/>
+        <p:nvPr/>
+      </p:nvGrpSpPr>
+      <p:grpSpPr>
+        <a:xfrm>
+          <a:off x="0" y="0"/>
+          <a:ext cx="0" cy="0"/>
+          <a:chOff x="0" y="0"/>
+          <a:chExt cx="0" cy="0"/>
+        </a:xfrm>
+      </p:grpSpPr>
+      <p:pic>
+        <p:nvPicPr>
+          <p:cNvPr id="4" name="Content Placeholder 3"/>
+          <p:cNvPicPr>
+            <a:picLocks noGrp="1" noChangeAspect="1"/>
+          </p:cNvPicPr>
+          <p:nvPr>
+            <p:ph idx="1"/>
+          </p:nvPr>
+        </p:nvPicPr>
+        <p:blipFill>
+          <a:blip r:embed="rId2">
+            <a:extLst>
+              <a:ext uri="{28A0092B-C50C-407E-A947-70E740481C1C}">
+                <a14:useLocalDpi xmlns:a14="http://schemas.microsoft.com/office/drawing/2010/main" val="0"/>
+              </a:ext>
+            </a:extLst>
+          </a:blip>
+          <a:stretch>
+            <a:fillRect/>
+          </a:stretch>
+        </p:blipFill>
+        <p:spPr>
+          <a:xfrm>
+            <a:off x="0" y="0"/>
+            <a:ext cx="12192000" cy="6861538"/>
+          </a:xfrm>
+        </p:spPr>
+      </p:pic>
+    </p:spTree>
+    <p:extLst>
+      <p:ext uri="{BB962C8B-B14F-4D97-AF65-F5344CB8AC3E}">
+        <p14:creationId xmlns:p14="http://schemas.microsoft.com/office/powerpoint/2010/main" val="1094535255"/>
+      </p:ext>
+    </p:extLst>
+  </p:cSld>
+  <p:clrMapOvr>
+    <a:masterClrMapping/>
+  </p:clrMapOvr>
+</p:sld>
+</file>
+
+<file path=ppt/slides/slide17.xml><?xml version="1.0" encoding="utf-8"?>
+<p:sld xmlns:a="http://schemas.openxmlformats.org/drawingml/2006/main" xmlns:r="http://schemas.openxmlformats.org/officeDocument/2006/relationships" xmlns:p="http://schemas.openxmlformats.org/presentationml/2006/main">
+  <p:cSld>
+    <p:spTree>
+      <p:nvGrpSpPr>
+        <p:cNvPr id="1" name=""/>
+        <p:cNvGrpSpPr/>
+        <p:nvPr/>
+      </p:nvGrpSpPr>
+      <p:grpSpPr>
+        <a:xfrm>
+          <a:off x="0" y="0"/>
+          <a:ext cx="0" cy="0"/>
+          <a:chOff x="0" y="0"/>
+          <a:chExt cx="0" cy="0"/>
+        </a:xfrm>
+      </p:grpSpPr>
+      <p:sp>
+        <p:nvSpPr>
+          <p:cNvPr id="2" name="Title 1"/>
+          <p:cNvSpPr>
+            <a:spLocks noGrp="1"/>
+          </p:cNvSpPr>
+          <p:nvPr>
+            <p:ph type="title"/>
+          </p:nvPr>
+        </p:nvSpPr>
+        <p:spPr/>
+        <p:txBody>
+          <a:bodyPr/>
+          <a:lstStyle/>
+          <a:p>
+            <a:r>
+              <a:rPr lang="en-US" dirty="0"/>
+              <a:t>Project Stack</a:t>
+            </a:r>
+          </a:p>
+        </p:txBody>
+      </p:sp>
+      <p:sp>
+        <p:nvSpPr>
+          <p:cNvPr id="3" name="Content Placeholder 2"/>
+          <p:cNvSpPr>
+            <a:spLocks noGrp="1"/>
+          </p:cNvSpPr>
+          <p:nvPr>
+            <p:ph idx="1"/>
+          </p:nvPr>
+        </p:nvSpPr>
+        <p:spPr/>
+        <p:txBody>
+          <a:bodyPr>
+            <a:noAutofit/>
+          </a:bodyPr>
+          <a:lstStyle/>
+          <a:p>
+            <a:r>
+              <a:rPr lang="en-US" sz="2800" dirty="0"/>
+              <a:t>Frontend: AngularJS with JavaScript and HTML</a:t>
+            </a:r>
+          </a:p>
+          <a:p>
+            <a:pPr lvl="1"/>
+            <a:r>
+              <a:rPr lang="en-US" sz="2800" dirty="0"/>
+              <a:t>Controller acts as a layer between view and data</a:t>
+            </a:r>
+          </a:p>
+          <a:p>
+            <a:pPr lvl="1"/>
+            <a:r>
+              <a:rPr lang="en-US" sz="2800" dirty="0"/>
+              <a:t>Directives provide frontend templating and modularization</a:t>
+            </a:r>
+          </a:p>
+          <a:p>
+            <a:pPr lvl="1"/>
+            <a:r>
+              <a:rPr lang="en-US" sz="2800" dirty="0"/>
+              <a:t>Services allow for reusable library modules</a:t>
+            </a:r>
+          </a:p>
+          <a:p>
+            <a:pPr lvl="1"/>
+            <a:r>
+              <a:rPr lang="en-US" sz="2800" dirty="0"/>
+              <a:t>HTML with Angular templating allow for two-way data binding between view and controller</a:t>
+            </a:r>
+          </a:p>
+        </p:txBody>
+      </p:sp>
+    </p:spTree>
+    <p:extLst>
+      <p:ext uri="{BB962C8B-B14F-4D97-AF65-F5344CB8AC3E}">
+        <p14:creationId xmlns:p14="http://schemas.microsoft.com/office/powerpoint/2010/main" val="1336446864"/>
+      </p:ext>
+    </p:extLst>
+  </p:cSld>
+  <p:clrMapOvr>
+    <a:masterClrMapping/>
+  </p:clrMapOvr>
+</p:sld>
+</file>
+
+<file path=ppt/slides/slide18.xml><?xml version="1.0" encoding="utf-8"?>
+<p:sld xmlns:a="http://schemas.openxmlformats.org/drawingml/2006/main" xmlns:r="http://schemas.openxmlformats.org/officeDocument/2006/relationships" xmlns:p="http://schemas.openxmlformats.org/presentationml/2006/main">
+  <p:cSld>
+    <p:spTree>
+      <p:nvGrpSpPr>
+        <p:cNvPr id="1" name=""/>
+        <p:cNvGrpSpPr/>
+        <p:nvPr/>
+      </p:nvGrpSpPr>
+      <p:grpSpPr>
+        <a:xfrm>
+          <a:off x="0" y="0"/>
+          <a:ext cx="0" cy="0"/>
+          <a:chOff x="0" y="0"/>
+          <a:chExt cx="0" cy="0"/>
+        </a:xfrm>
+      </p:grpSpPr>
+      <p:sp>
+        <p:nvSpPr>
+          <p:cNvPr id="2" name="Title 1"/>
+          <p:cNvSpPr>
+            <a:spLocks noGrp="1"/>
+          </p:cNvSpPr>
+          <p:nvPr>
+            <p:ph type="title"/>
+          </p:nvPr>
+        </p:nvSpPr>
+        <p:spPr/>
+        <p:txBody>
+          <a:bodyPr/>
+          <a:lstStyle/>
+          <a:p>
+            <a:r>
+              <a:rPr lang="en-US" dirty="0"/>
+              <a:t>Project Stack Cont.</a:t>
+            </a:r>
+          </a:p>
+        </p:txBody>
+      </p:sp>
+      <p:sp>
+        <p:nvSpPr>
+          <p:cNvPr id="3" name="Content Placeholder 2"/>
+          <p:cNvSpPr>
+            <a:spLocks noGrp="1"/>
+          </p:cNvSpPr>
+          <p:nvPr>
+            <p:ph idx="1"/>
+          </p:nvPr>
+        </p:nvSpPr>
+        <p:spPr/>
+        <p:txBody>
+          <a:bodyPr/>
+          <a:lstStyle/>
+          <a:p>
+            <a:r>
+              <a:rPr lang="en-US" sz="2800" dirty="0"/>
+              <a:t>Other Software</a:t>
+            </a:r>
+          </a:p>
+          <a:p>
+            <a:pPr lvl="1"/>
+            <a:r>
+              <a:rPr lang="en-US" sz="2400" dirty="0"/>
+              <a:t>Google Maps for showing geographical data</a:t>
+            </a:r>
+          </a:p>
+          <a:p>
+            <a:pPr lvl="1"/>
+            <a:r>
+              <a:rPr lang="en-US" sz="2400" dirty="0"/>
+              <a:t>D3 allows for rendering graphical representations</a:t>
+            </a:r>
+            <a:endParaRPr lang="en-US" sz="2600" dirty="0"/>
+          </a:p>
+          <a:p>
+            <a:r>
+              <a:rPr lang="en-US" sz="2800" dirty="0"/>
+              <a:t>Backend: Node JavaScript server</a:t>
+            </a:r>
+          </a:p>
+          <a:p>
+            <a:pPr lvl="1"/>
+            <a:r>
+              <a:rPr lang="en-US" sz="2400" dirty="0" err="1"/>
+              <a:t>ExpressJS</a:t>
+            </a:r>
+            <a:r>
+              <a:rPr lang="en-US" sz="2400" dirty="0"/>
+              <a:t> provides routing facilities</a:t>
+            </a:r>
+          </a:p>
+          <a:p>
+            <a:pPr lvl="1"/>
+            <a:r>
+              <a:rPr lang="en-US" sz="2400" dirty="0"/>
+              <a:t>Node file system library along with CSV library deserializes data on startup</a:t>
+            </a:r>
+          </a:p>
+          <a:p>
+            <a:endParaRPr lang="en-US" dirty="0"/>
+          </a:p>
+        </p:txBody>
+      </p:sp>
+    </p:spTree>
+    <p:extLst>
+      <p:ext uri="{BB962C8B-B14F-4D97-AF65-F5344CB8AC3E}">
+        <p14:creationId xmlns:p14="http://schemas.microsoft.com/office/powerpoint/2010/main" val="982542357"/>
+      </p:ext>
+    </p:extLst>
+  </p:cSld>
+  <p:clrMapOvr>
+    <a:masterClrMapping/>
+  </p:clrMapOvr>
+</p:sld>
+</file>
+
+<file path=ppt/slides/slide19.xml><?xml version="1.0" encoding="utf-8"?>
+<p:sld xmlns:a="http://schemas.openxmlformats.org/drawingml/2006/main" xmlns:r="http://schemas.openxmlformats.org/officeDocument/2006/relationships" xmlns:p="http://schemas.openxmlformats.org/presentationml/2006/main">
+  <p:cSld>
+    <p:spTree>
+      <p:nvGrpSpPr>
+        <p:cNvPr id="1" name=""/>
+        <p:cNvGrpSpPr/>
+        <p:nvPr/>
+      </p:nvGrpSpPr>
+      <p:grpSpPr>
+        <a:xfrm>
+          <a:off x="0" y="0"/>
+          <a:ext cx="0" cy="0"/>
+          <a:chOff x="0" y="0"/>
+          <a:chExt cx="0" cy="0"/>
+        </a:xfrm>
+      </p:grpSpPr>
+      <p:sp>
+        <p:nvSpPr>
+          <p:cNvPr id="2" name="Title 1"/>
+          <p:cNvSpPr>
+            <a:spLocks noGrp="1"/>
+          </p:cNvSpPr>
+          <p:nvPr>
+            <p:ph type="title"/>
+          </p:nvPr>
+        </p:nvSpPr>
+        <p:spPr/>
+        <p:txBody>
+          <a:bodyPr/>
+          <a:lstStyle/>
+          <a:p>
+            <a:r>
+              <a:rPr lang="en-US" dirty="0"/>
+              <a:t>Misc. Software</a:t>
             </a:r>
           </a:p>
         </p:txBody>
@@ -3947,20 +5716,916 @@
           <a:lstStyle/>
           <a:p>
             <a:r>
+              <a:rPr lang="en-US" sz="2800" dirty="0" err="1"/>
+              <a:t>Lodash</a:t>
+            </a:r>
+            <a:r>
               <a:rPr lang="en-US" sz="2800" dirty="0"/>
-              <a:t>Consists of four separate views</a:t>
-            </a:r>
-          </a:p>
-          <a:p>
+              <a:t> – JavaScript data structure utility library</a:t>
+            </a:r>
+          </a:p>
+          <a:p>
+            <a:r>
+              <a:rPr lang="en-US" sz="2800" dirty="0" err="1"/>
+              <a:t>dateFormat</a:t>
+            </a:r>
             <a:r>
               <a:rPr lang="en-US" sz="2800" dirty="0"/>
-              <a:t>Can filter the dataset to be resented by all views</a:t>
-            </a:r>
-          </a:p>
-          <a:p>
+              <a:t>() – Library for JavaScript date formatting</a:t>
+            </a:r>
+          </a:p>
+          <a:p>
+            <a:r>
+              <a:rPr lang="en-US" sz="2800" dirty="0" err="1"/>
+              <a:t>MarkerClusterer</a:t>
+            </a:r>
             <a:r>
               <a:rPr lang="en-US" sz="2800" dirty="0"/>
-              <a:t>Able to sift through this data within the individual views</a:t>
+              <a:t> – Utility for grouping Google Map markers</a:t>
+            </a:r>
+          </a:p>
+          <a:p>
+            <a:r>
+              <a:rPr lang="en-US" sz="2800" dirty="0" err="1"/>
+              <a:t>SortTable</a:t>
+            </a:r>
+            <a:r>
+              <a:rPr lang="en-US" sz="2800" dirty="0"/>
+              <a:t> – Tool for making sortable HTML table headers</a:t>
+            </a:r>
+          </a:p>
+        </p:txBody>
+      </p:sp>
+    </p:spTree>
+    <p:extLst>
+      <p:ext uri="{BB962C8B-B14F-4D97-AF65-F5344CB8AC3E}">
+        <p14:creationId xmlns:p14="http://schemas.microsoft.com/office/powerpoint/2010/main" val="836344187"/>
+      </p:ext>
+    </p:extLst>
+  </p:cSld>
+  <p:clrMapOvr>
+    <a:masterClrMapping/>
+  </p:clrMapOvr>
+</p:sld>
+</file>
+
+<file path=ppt/slides/slide2.xml><?xml version="1.0" encoding="utf-8"?>
+<p:sld xmlns:a="http://schemas.openxmlformats.org/drawingml/2006/main" xmlns:r="http://schemas.openxmlformats.org/officeDocument/2006/relationships" xmlns:p="http://schemas.openxmlformats.org/presentationml/2006/main">
+  <p:cSld>
+    <p:spTree>
+      <p:nvGrpSpPr>
+        <p:cNvPr id="1" name=""/>
+        <p:cNvGrpSpPr/>
+        <p:nvPr/>
+      </p:nvGrpSpPr>
+      <p:grpSpPr>
+        <a:xfrm>
+          <a:off x="0" y="0"/>
+          <a:ext cx="0" cy="0"/>
+          <a:chOff x="0" y="0"/>
+          <a:chExt cx="0" cy="0"/>
+        </a:xfrm>
+      </p:grpSpPr>
+      <p:sp>
+        <p:nvSpPr>
+          <p:cNvPr id="2" name="Title 1"/>
+          <p:cNvSpPr>
+            <a:spLocks noGrp="1"/>
+          </p:cNvSpPr>
+          <p:nvPr>
+            <p:ph type="title"/>
+          </p:nvPr>
+        </p:nvSpPr>
+        <p:spPr/>
+        <p:txBody>
+          <a:bodyPr/>
+          <a:lstStyle/>
+          <a:p>
+            <a:r>
+              <a:rPr lang="en-US" dirty="0"/>
+              <a:t>Problem</a:t>
+            </a:r>
+          </a:p>
+        </p:txBody>
+      </p:sp>
+      <p:sp>
+        <p:nvSpPr>
+          <p:cNvPr id="3" name="Content Placeholder 2"/>
+          <p:cNvSpPr>
+            <a:spLocks noGrp="1"/>
+          </p:cNvSpPr>
+          <p:nvPr>
+            <p:ph idx="1"/>
+          </p:nvPr>
+        </p:nvSpPr>
+        <p:spPr/>
+        <p:txBody>
+          <a:bodyPr>
+            <a:normAutofit/>
+          </a:bodyPr>
+          <a:lstStyle/>
+          <a:p>
+            <a:r>
+              <a:rPr lang="en-US" sz="2800" dirty="0"/>
+              <a:t>Crime is an ever-present issue</a:t>
+            </a:r>
+          </a:p>
+          <a:p>
+            <a:r>
+              <a:rPr lang="en-US" sz="2800" dirty="0"/>
+              <a:t>Crimes committed everyday are just added on top of a growing “pile” of data</a:t>
+            </a:r>
+          </a:p>
+          <a:p>
+            <a:r>
+              <a:rPr lang="en-US" sz="2800" dirty="0"/>
+              <a:t>Much of this data is textual in nature</a:t>
+            </a:r>
+          </a:p>
+          <a:p>
+            <a:pPr lvl="1"/>
+            <a:r>
+              <a:rPr lang="en-US" sz="2800" dirty="0"/>
+              <a:t>Location values</a:t>
+            </a:r>
+          </a:p>
+          <a:p>
+            <a:pPr lvl="1"/>
+            <a:r>
+              <a:rPr lang="en-US" sz="2800" dirty="0"/>
+              <a:t>Date/Time data</a:t>
+            </a:r>
+          </a:p>
+          <a:p>
+            <a:r>
+              <a:rPr lang="en-US" sz="2800" dirty="0"/>
+              <a:t>Need a way to visualize this data</a:t>
+            </a:r>
+          </a:p>
+        </p:txBody>
+      </p:sp>
+    </p:spTree>
+    <p:extLst>
+      <p:ext uri="{BB962C8B-B14F-4D97-AF65-F5344CB8AC3E}">
+        <p14:creationId xmlns:p14="http://schemas.microsoft.com/office/powerpoint/2010/main" val="2905820242"/>
+      </p:ext>
+    </p:extLst>
+  </p:cSld>
+  <p:clrMapOvr>
+    <a:masterClrMapping/>
+  </p:clrMapOvr>
+</p:sld>
+</file>
+
+<file path=ppt/slides/slide20.xml><?xml version="1.0" encoding="utf-8"?>
+<p:sld xmlns:a="http://schemas.openxmlformats.org/drawingml/2006/main" xmlns:r="http://schemas.openxmlformats.org/officeDocument/2006/relationships" xmlns:p="http://schemas.openxmlformats.org/presentationml/2006/main">
+  <p:cSld>
+    <p:spTree>
+      <p:nvGrpSpPr>
+        <p:cNvPr id="1" name=""/>
+        <p:cNvGrpSpPr/>
+        <p:nvPr/>
+      </p:nvGrpSpPr>
+      <p:grpSpPr>
+        <a:xfrm>
+          <a:off x="0" y="0"/>
+          <a:ext cx="0" cy="0"/>
+          <a:chOff x="0" y="0"/>
+          <a:chExt cx="0" cy="0"/>
+        </a:xfrm>
+      </p:grpSpPr>
+      <p:sp>
+        <p:nvSpPr>
+          <p:cNvPr id="2" name="Title 1"/>
+          <p:cNvSpPr>
+            <a:spLocks noGrp="1"/>
+          </p:cNvSpPr>
+          <p:nvPr>
+            <p:ph type="title"/>
+          </p:nvPr>
+        </p:nvSpPr>
+        <p:spPr/>
+        <p:txBody>
+          <a:bodyPr/>
+          <a:lstStyle/>
+          <a:p>
+            <a:r>
+              <a:rPr lang="en-US" dirty="0"/>
+              <a:t>Project Architecture</a:t>
+            </a:r>
+          </a:p>
+        </p:txBody>
+      </p:sp>
+    </p:spTree>
+    <p:extLst>
+      <p:ext uri="{BB962C8B-B14F-4D97-AF65-F5344CB8AC3E}">
+        <p14:creationId xmlns:p14="http://schemas.microsoft.com/office/powerpoint/2010/main" val="3383771456"/>
+      </p:ext>
+    </p:extLst>
+  </p:cSld>
+  <p:clrMapOvr>
+    <a:masterClrMapping/>
+  </p:clrMapOvr>
+</p:sld>
+</file>
+
+<file path=ppt/slides/slide21.xml><?xml version="1.0" encoding="utf-8"?>
+<p:sld xmlns:a="http://schemas.openxmlformats.org/drawingml/2006/main" xmlns:r="http://schemas.openxmlformats.org/officeDocument/2006/relationships" xmlns:p="http://schemas.openxmlformats.org/presentationml/2006/main">
+  <p:cSld>
+    <p:spTree>
+      <p:nvGrpSpPr>
+        <p:cNvPr id="1" name=""/>
+        <p:cNvGrpSpPr/>
+        <p:nvPr/>
+      </p:nvGrpSpPr>
+      <p:grpSpPr>
+        <a:xfrm>
+          <a:off x="0" y="0"/>
+          <a:ext cx="0" cy="0"/>
+          <a:chOff x="0" y="0"/>
+          <a:chExt cx="0" cy="0"/>
+        </a:xfrm>
+      </p:grpSpPr>
+      <p:sp>
+        <p:nvSpPr>
+          <p:cNvPr id="2" name="Title 1"/>
+          <p:cNvSpPr>
+            <a:spLocks noGrp="1"/>
+          </p:cNvSpPr>
+          <p:nvPr>
+            <p:ph type="title"/>
+          </p:nvPr>
+        </p:nvSpPr>
+        <p:spPr/>
+        <p:txBody>
+          <a:bodyPr/>
+          <a:lstStyle/>
+          <a:p>
+            <a:r>
+              <a:rPr lang="en-US" dirty="0"/>
+              <a:t>/</a:t>
+            </a:r>
+          </a:p>
+        </p:txBody>
+      </p:sp>
+      <p:pic>
+        <p:nvPicPr>
+          <p:cNvPr id="4" name="Content Placeholder 3"/>
+          <p:cNvPicPr>
+            <a:picLocks noGrp="1" noChangeAspect="1"/>
+          </p:cNvPicPr>
+          <p:nvPr>
+            <p:ph idx="1"/>
+          </p:nvPr>
+        </p:nvPicPr>
+        <p:blipFill rotWithShape="1">
+          <a:blip r:embed="rId3">
+            <a:extLst>
+              <a:ext uri="{28A0092B-C50C-407E-A947-70E740481C1C}">
+                <a14:useLocalDpi xmlns:a14="http://schemas.microsoft.com/office/drawing/2010/main" val="0"/>
+              </a:ext>
+            </a:extLst>
+          </a:blip>
+          <a:srcRect r="24738" b="58253"/>
+          <a:stretch/>
+        </p:blipFill>
+        <p:spPr>
+          <a:xfrm>
+            <a:off x="0" y="0"/>
+            <a:ext cx="12192000" cy="6858000"/>
+          </a:xfrm>
+        </p:spPr>
+      </p:pic>
+    </p:spTree>
+    <p:extLst>
+      <p:ext uri="{BB962C8B-B14F-4D97-AF65-F5344CB8AC3E}">
+        <p14:creationId xmlns:p14="http://schemas.microsoft.com/office/powerpoint/2010/main" val="3928143034"/>
+      </p:ext>
+    </p:extLst>
+  </p:cSld>
+  <p:clrMapOvr>
+    <a:masterClrMapping/>
+  </p:clrMapOvr>
+</p:sld>
+</file>
+
+<file path=ppt/slides/slide22.xml><?xml version="1.0" encoding="utf-8"?>
+<p:sld xmlns:a="http://schemas.openxmlformats.org/drawingml/2006/main" xmlns:r="http://schemas.openxmlformats.org/officeDocument/2006/relationships" xmlns:p="http://schemas.openxmlformats.org/presentationml/2006/main">
+  <p:cSld>
+    <p:spTree>
+      <p:nvGrpSpPr>
+        <p:cNvPr id="1" name=""/>
+        <p:cNvGrpSpPr/>
+        <p:nvPr/>
+      </p:nvGrpSpPr>
+      <p:grpSpPr>
+        <a:xfrm>
+          <a:off x="0" y="0"/>
+          <a:ext cx="0" cy="0"/>
+          <a:chOff x="0" y="0"/>
+          <a:chExt cx="0" cy="0"/>
+        </a:xfrm>
+      </p:grpSpPr>
+      <p:sp>
+        <p:nvSpPr>
+          <p:cNvPr id="2" name="Title 1"/>
+          <p:cNvSpPr>
+            <a:spLocks noGrp="1"/>
+          </p:cNvSpPr>
+          <p:nvPr>
+            <p:ph type="title"/>
+          </p:nvPr>
+        </p:nvSpPr>
+        <p:spPr/>
+        <p:txBody>
+          <a:bodyPr/>
+          <a:lstStyle/>
+          <a:p>
+            <a:r>
+              <a:rPr lang="en-US" dirty="0"/>
+              <a:t>Challenges</a:t>
+            </a:r>
+          </a:p>
+        </p:txBody>
+      </p:sp>
+      <p:sp>
+        <p:nvSpPr>
+          <p:cNvPr id="3" name="Content Placeholder 2"/>
+          <p:cNvSpPr>
+            <a:spLocks noGrp="1"/>
+          </p:cNvSpPr>
+          <p:nvPr>
+            <p:ph idx="1"/>
+          </p:nvPr>
+        </p:nvSpPr>
+        <p:spPr/>
+        <p:txBody>
+          <a:bodyPr>
+            <a:normAutofit/>
+          </a:bodyPr>
+          <a:lstStyle/>
+          <a:p>
+            <a:r>
+              <a:rPr lang="en-US" sz="2800" dirty="0"/>
+              <a:t>Deciding the purpose and scope of the project</a:t>
+            </a:r>
+          </a:p>
+          <a:p>
+            <a:pPr lvl="1"/>
+            <a:r>
+              <a:rPr lang="en-US" sz="2600" dirty="0"/>
+              <a:t>Many different dimensions of data allows for almost limitless inquiry</a:t>
+            </a:r>
+          </a:p>
+          <a:p>
+            <a:r>
+              <a:rPr lang="en-US" sz="2800" dirty="0"/>
+              <a:t>Dataset was very large, performance was always a concern</a:t>
+            </a:r>
+          </a:p>
+          <a:p>
+            <a:pPr lvl="1"/>
+            <a:r>
+              <a:rPr lang="en-US" sz="2800" dirty="0"/>
+              <a:t>Memory consumption</a:t>
+            </a:r>
+          </a:p>
+          <a:p>
+            <a:pPr lvl="1"/>
+            <a:r>
+              <a:rPr lang="en-US" sz="2800" dirty="0"/>
+              <a:t>Computational performance</a:t>
+            </a:r>
+          </a:p>
+          <a:p>
+            <a:r>
+              <a:rPr lang="en-US" sz="2800" dirty="0"/>
+              <a:t>Diverse software stack complicated communication between modules</a:t>
+            </a:r>
+          </a:p>
+        </p:txBody>
+      </p:sp>
+    </p:spTree>
+    <p:extLst>
+      <p:ext uri="{BB962C8B-B14F-4D97-AF65-F5344CB8AC3E}">
+        <p14:creationId xmlns:p14="http://schemas.microsoft.com/office/powerpoint/2010/main" val="1888555791"/>
+      </p:ext>
+    </p:extLst>
+  </p:cSld>
+  <p:clrMapOvr>
+    <a:masterClrMapping/>
+  </p:clrMapOvr>
+</p:sld>
+</file>
+
+<file path=ppt/slides/slide23.xml><?xml version="1.0" encoding="utf-8"?>
+<p:sld xmlns:a="http://schemas.openxmlformats.org/drawingml/2006/main" xmlns:r="http://schemas.openxmlformats.org/officeDocument/2006/relationships" xmlns:p="http://schemas.openxmlformats.org/presentationml/2006/main">
+  <p:cSld>
+    <p:spTree>
+      <p:nvGrpSpPr>
+        <p:cNvPr id="1" name=""/>
+        <p:cNvGrpSpPr/>
+        <p:nvPr/>
+      </p:nvGrpSpPr>
+      <p:grpSpPr>
+        <a:xfrm>
+          <a:off x="0" y="0"/>
+          <a:ext cx="0" cy="0"/>
+          <a:chOff x="0" y="0"/>
+          <a:chExt cx="0" cy="0"/>
+        </a:xfrm>
+      </p:grpSpPr>
+      <p:sp>
+        <p:nvSpPr>
+          <p:cNvPr id="2" name="Title 1"/>
+          <p:cNvSpPr>
+            <a:spLocks noGrp="1"/>
+          </p:cNvSpPr>
+          <p:nvPr>
+            <p:ph type="title"/>
+          </p:nvPr>
+        </p:nvSpPr>
+        <p:spPr/>
+        <p:txBody>
+          <a:bodyPr/>
+          <a:lstStyle/>
+          <a:p>
+            <a:r>
+              <a:rPr lang="en-US" dirty="0"/>
+              <a:t>Future Work</a:t>
+            </a:r>
+          </a:p>
+        </p:txBody>
+      </p:sp>
+      <p:sp>
+        <p:nvSpPr>
+          <p:cNvPr id="3" name="Content Placeholder 2"/>
+          <p:cNvSpPr>
+            <a:spLocks noGrp="1"/>
+          </p:cNvSpPr>
+          <p:nvPr>
+            <p:ph idx="1"/>
+          </p:nvPr>
+        </p:nvSpPr>
+        <p:spPr/>
+        <p:txBody>
+          <a:bodyPr>
+            <a:normAutofit/>
+          </a:bodyPr>
+          <a:lstStyle/>
+          <a:p>
+            <a:r>
+              <a:rPr lang="en-US" sz="2800" dirty="0"/>
+              <a:t>Warn user when requesting a large number of API results</a:t>
+            </a:r>
+          </a:p>
+          <a:p>
+            <a:r>
+              <a:rPr lang="en-US" sz="2800" dirty="0"/>
+              <a:t>Differentiate clustered markers with same location</a:t>
+            </a:r>
+          </a:p>
+          <a:p>
+            <a:r>
+              <a:rPr lang="en-US" sz="2800" dirty="0"/>
+              <a:t>Add a view which organizes crimes according to when they occurred</a:t>
+            </a:r>
+          </a:p>
+          <a:p>
+            <a:r>
+              <a:rPr lang="en-US" sz="2800" dirty="0"/>
+              <a:t>Qualitative user study</a:t>
+            </a:r>
+          </a:p>
+        </p:txBody>
+      </p:sp>
+    </p:spTree>
+    <p:extLst>
+      <p:ext uri="{BB962C8B-B14F-4D97-AF65-F5344CB8AC3E}">
+        <p14:creationId xmlns:p14="http://schemas.microsoft.com/office/powerpoint/2010/main" val="1973424099"/>
+      </p:ext>
+    </p:extLst>
+  </p:cSld>
+  <p:clrMapOvr>
+    <a:masterClrMapping/>
+  </p:clrMapOvr>
+</p:sld>
+</file>
+
+<file path=ppt/slides/slide24.xml><?xml version="1.0" encoding="utf-8"?>
+<p:sld xmlns:a="http://schemas.openxmlformats.org/drawingml/2006/main" xmlns:r="http://schemas.openxmlformats.org/officeDocument/2006/relationships" xmlns:p="http://schemas.openxmlformats.org/presentationml/2006/main">
+  <p:cSld>
+    <p:spTree>
+      <p:nvGrpSpPr>
+        <p:cNvPr id="1" name=""/>
+        <p:cNvGrpSpPr/>
+        <p:nvPr/>
+      </p:nvGrpSpPr>
+      <p:grpSpPr>
+        <a:xfrm>
+          <a:off x="0" y="0"/>
+          <a:ext cx="0" cy="0"/>
+          <a:chOff x="0" y="0"/>
+          <a:chExt cx="0" cy="0"/>
+        </a:xfrm>
+      </p:grpSpPr>
+      <p:sp>
+        <p:nvSpPr>
+          <p:cNvPr id="2" name="Title 1"/>
+          <p:cNvSpPr>
+            <a:spLocks noGrp="1"/>
+          </p:cNvSpPr>
+          <p:nvPr>
+            <p:ph type="title"/>
+          </p:nvPr>
+        </p:nvSpPr>
+        <p:spPr/>
+        <p:txBody>
+          <a:bodyPr/>
+          <a:lstStyle/>
+          <a:p>
+            <a:r>
+              <a:rPr lang="en-US" dirty="0"/>
+              <a:t>Conclusions</a:t>
+            </a:r>
+          </a:p>
+        </p:txBody>
+      </p:sp>
+      <p:sp>
+        <p:nvSpPr>
+          <p:cNvPr id="3" name="Content Placeholder 2"/>
+          <p:cNvSpPr>
+            <a:spLocks noGrp="1"/>
+          </p:cNvSpPr>
+          <p:nvPr>
+            <p:ph idx="1"/>
+          </p:nvPr>
+        </p:nvSpPr>
+        <p:spPr/>
+        <p:txBody>
+          <a:bodyPr>
+            <a:normAutofit/>
+          </a:bodyPr>
+          <a:lstStyle/>
+          <a:p>
+            <a:r>
+              <a:rPr lang="en-US" sz="2800" dirty="0"/>
+              <a:t>Many different pieces went into building this application</a:t>
+            </a:r>
+          </a:p>
+          <a:p>
+            <a:r>
+              <a:rPr lang="en-US" sz="2800" dirty="0"/>
+              <a:t>Server is key to performance when working with lots of data</a:t>
+            </a:r>
+          </a:p>
+          <a:p>
+            <a:r>
+              <a:rPr lang="en-US" sz="2800" dirty="0"/>
+              <a:t>Must be judicious with what pieces of the data you want to visualize</a:t>
+            </a:r>
+          </a:p>
+          <a:p>
+            <a:r>
+              <a:rPr lang="en-US" sz="2800" dirty="0"/>
+              <a:t>Different views are useful for focusing what you want to show</a:t>
+            </a:r>
+          </a:p>
+          <a:p>
+            <a:endParaRPr lang="en-US" sz="2800" dirty="0"/>
+          </a:p>
+        </p:txBody>
+      </p:sp>
+    </p:spTree>
+    <p:extLst>
+      <p:ext uri="{BB962C8B-B14F-4D97-AF65-F5344CB8AC3E}">
+        <p14:creationId xmlns:p14="http://schemas.microsoft.com/office/powerpoint/2010/main" val="1713656803"/>
+      </p:ext>
+    </p:extLst>
+  </p:cSld>
+  <p:clrMapOvr>
+    <a:masterClrMapping/>
+  </p:clrMapOvr>
+</p:sld>
+</file>
+
+<file path=ppt/slides/slide25.xml><?xml version="1.0" encoding="utf-8"?>
+<p:sld xmlns:a="http://schemas.openxmlformats.org/drawingml/2006/main" xmlns:r="http://schemas.openxmlformats.org/officeDocument/2006/relationships" xmlns:p="http://schemas.openxmlformats.org/presentationml/2006/main">
+  <p:cSld>
+    <p:spTree>
+      <p:nvGrpSpPr>
+        <p:cNvPr id="1" name=""/>
+        <p:cNvGrpSpPr/>
+        <p:nvPr/>
+      </p:nvGrpSpPr>
+      <p:grpSpPr>
+        <a:xfrm>
+          <a:off x="0" y="0"/>
+          <a:ext cx="0" cy="0"/>
+          <a:chOff x="0" y="0"/>
+          <a:chExt cx="0" cy="0"/>
+        </a:xfrm>
+      </p:grpSpPr>
+      <p:sp>
+        <p:nvSpPr>
+          <p:cNvPr id="2" name="Title 1"/>
+          <p:cNvSpPr>
+            <a:spLocks noGrp="1"/>
+          </p:cNvSpPr>
+          <p:nvPr>
+            <p:ph type="title"/>
+          </p:nvPr>
+        </p:nvSpPr>
+        <p:spPr/>
+        <p:txBody>
+          <a:bodyPr/>
+          <a:lstStyle/>
+          <a:p>
+            <a:r>
+              <a:rPr lang="en-US" dirty="0"/>
+              <a:t>Questions?</a:t>
+            </a:r>
+          </a:p>
+        </p:txBody>
+      </p:sp>
+    </p:spTree>
+    <p:extLst>
+      <p:ext uri="{BB962C8B-B14F-4D97-AF65-F5344CB8AC3E}">
+        <p14:creationId xmlns:p14="http://schemas.microsoft.com/office/powerpoint/2010/main" val="2854765581"/>
+      </p:ext>
+    </p:extLst>
+  </p:cSld>
+  <p:clrMapOvr>
+    <a:masterClrMapping/>
+  </p:clrMapOvr>
+</p:sld>
+</file>
+
+<file path=ppt/slides/slide3.xml><?xml version="1.0" encoding="utf-8"?>
+<p:sld xmlns:a="http://schemas.openxmlformats.org/drawingml/2006/main" xmlns:r="http://schemas.openxmlformats.org/officeDocument/2006/relationships" xmlns:p="http://schemas.openxmlformats.org/presentationml/2006/main">
+  <p:cSld>
+    <p:spTree>
+      <p:nvGrpSpPr>
+        <p:cNvPr id="1" name=""/>
+        <p:cNvGrpSpPr/>
+        <p:nvPr/>
+      </p:nvGrpSpPr>
+      <p:grpSpPr>
+        <a:xfrm>
+          <a:off x="0" y="0"/>
+          <a:ext cx="0" cy="0"/>
+          <a:chOff x="0" y="0"/>
+          <a:chExt cx="0" cy="0"/>
+        </a:xfrm>
+      </p:grpSpPr>
+      <p:sp>
+        <p:nvSpPr>
+          <p:cNvPr id="2" name="Title 1"/>
+          <p:cNvSpPr>
+            <a:spLocks noGrp="1"/>
+          </p:cNvSpPr>
+          <p:nvPr>
+            <p:ph type="title"/>
+          </p:nvPr>
+        </p:nvSpPr>
+        <p:spPr/>
+        <p:txBody>
+          <a:bodyPr/>
+          <a:lstStyle/>
+          <a:p>
+            <a:r>
+              <a:rPr lang="en-US" dirty="0"/>
+              <a:t>Audience</a:t>
+            </a:r>
+          </a:p>
+        </p:txBody>
+      </p:sp>
+      <p:sp>
+        <p:nvSpPr>
+          <p:cNvPr id="3" name="Content Placeholder 2"/>
+          <p:cNvSpPr>
+            <a:spLocks noGrp="1"/>
+          </p:cNvSpPr>
+          <p:nvPr>
+            <p:ph idx="1"/>
+          </p:nvPr>
+        </p:nvSpPr>
+        <p:spPr/>
+        <p:txBody>
+          <a:bodyPr>
+            <a:normAutofit/>
+          </a:bodyPr>
+          <a:lstStyle/>
+          <a:p>
+            <a:r>
+              <a:rPr lang="en-US" sz="2800" dirty="0"/>
+              <a:t>Wanted views to be plain and easy to understand</a:t>
+            </a:r>
+          </a:p>
+          <a:p>
+            <a:r>
+              <a:rPr lang="en-US" sz="2800" dirty="0"/>
+              <a:t>Also wanted users to be able to dive into and explore the data</a:t>
+            </a:r>
+          </a:p>
+          <a:p>
+            <a:r>
+              <a:rPr lang="en-US" sz="2800" dirty="0">
+                <a:solidFill>
+                  <a:schemeClr val="tx1"/>
+                </a:solidFill>
+              </a:rPr>
+              <a:t>Can be appreciated by the general public</a:t>
+            </a:r>
+          </a:p>
+          <a:p>
+            <a:r>
+              <a:rPr lang="en-US" sz="2800" dirty="0">
+                <a:solidFill>
+                  <a:schemeClr val="tx1"/>
+                </a:solidFill>
+              </a:rPr>
+              <a:t>Power users should be able to ask and answer more interesting questions</a:t>
+            </a:r>
+          </a:p>
+        </p:txBody>
+      </p:sp>
+    </p:spTree>
+    <p:extLst>
+      <p:ext uri="{BB962C8B-B14F-4D97-AF65-F5344CB8AC3E}">
+        <p14:creationId xmlns:p14="http://schemas.microsoft.com/office/powerpoint/2010/main" val="49346205"/>
+      </p:ext>
+    </p:extLst>
+  </p:cSld>
+  <p:clrMapOvr>
+    <a:masterClrMapping/>
+  </p:clrMapOvr>
+</p:sld>
+</file>
+
+<file path=ppt/slides/slide4.xml><?xml version="1.0" encoding="utf-8"?>
+<p:sld xmlns:a="http://schemas.openxmlformats.org/drawingml/2006/main" xmlns:r="http://schemas.openxmlformats.org/officeDocument/2006/relationships" xmlns:p="http://schemas.openxmlformats.org/presentationml/2006/main">
+  <p:cSld>
+    <p:spTree>
+      <p:nvGrpSpPr>
+        <p:cNvPr id="1" name=""/>
+        <p:cNvGrpSpPr/>
+        <p:nvPr/>
+      </p:nvGrpSpPr>
+      <p:grpSpPr>
+        <a:xfrm>
+          <a:off x="0" y="0"/>
+          <a:ext cx="0" cy="0"/>
+          <a:chOff x="0" y="0"/>
+          <a:chExt cx="0" cy="0"/>
+        </a:xfrm>
+      </p:grpSpPr>
+      <p:sp>
+        <p:nvSpPr>
+          <p:cNvPr id="2" name="Title 1"/>
+          <p:cNvSpPr>
+            <a:spLocks noGrp="1"/>
+          </p:cNvSpPr>
+          <p:nvPr>
+            <p:ph type="title"/>
+          </p:nvPr>
+        </p:nvSpPr>
+        <p:spPr/>
+        <p:txBody>
+          <a:bodyPr/>
+          <a:lstStyle/>
+          <a:p>
+            <a:r>
+              <a:rPr lang="en-US" dirty="0"/>
+              <a:t>Dataset</a:t>
+            </a:r>
+          </a:p>
+        </p:txBody>
+      </p:sp>
+      <p:sp>
+        <p:nvSpPr>
+          <p:cNvPr id="3" name="Content Placeholder 2"/>
+          <p:cNvSpPr>
+            <a:spLocks noGrp="1"/>
+          </p:cNvSpPr>
+          <p:nvPr>
+            <p:ph idx="1"/>
+          </p:nvPr>
+        </p:nvSpPr>
+        <p:spPr>
+          <a:xfrm>
+            <a:off x="1097280" y="1845733"/>
+            <a:ext cx="10058400" cy="4211117"/>
+          </a:xfrm>
+        </p:spPr>
+        <p:txBody>
+          <a:bodyPr>
+            <a:normAutofit/>
+          </a:bodyPr>
+          <a:lstStyle/>
+          <a:p>
+            <a:r>
+              <a:rPr lang="en-US" sz="2800" dirty="0"/>
+              <a:t>Consists of reported criminal activity within the city limits of Chicago, Illinois</a:t>
+            </a:r>
+          </a:p>
+          <a:p>
+            <a:r>
+              <a:rPr lang="en-US" sz="2800" dirty="0"/>
+              <a:t>Each data element represents a single reported crime</a:t>
+            </a:r>
+          </a:p>
+          <a:p>
+            <a:pPr lvl="1"/>
+            <a:r>
+              <a:rPr lang="en-US" sz="2600" dirty="0"/>
+              <a:t>Except homicides which are divided in to crime/victim</a:t>
+            </a:r>
+          </a:p>
+          <a:p>
+            <a:r>
+              <a:rPr lang="en-US" sz="2800" dirty="0"/>
+              <a:t>Each row value consists of several column values</a:t>
+            </a:r>
+          </a:p>
+          <a:p>
+            <a:pPr lvl="1"/>
+            <a:r>
+              <a:rPr lang="en-US" sz="2600" dirty="0"/>
+              <a:t>Crime type</a:t>
+            </a:r>
+          </a:p>
+          <a:p>
+            <a:pPr lvl="1"/>
+            <a:r>
+              <a:rPr lang="en-US" sz="2600" dirty="0"/>
+              <a:t>Latitude/Longitude where crime occurred</a:t>
+            </a:r>
+          </a:p>
+          <a:p>
+            <a:pPr lvl="1"/>
+            <a:r>
+              <a:rPr lang="en-US" sz="2600" dirty="0"/>
+              <a:t>Chicago community area</a:t>
+            </a:r>
+          </a:p>
+          <a:p>
+            <a:pPr lvl="1"/>
+            <a:r>
+              <a:rPr lang="en-US" sz="2600" dirty="0"/>
+              <a:t>Date/Time when crime occurred</a:t>
+            </a:r>
+          </a:p>
+        </p:txBody>
+      </p:sp>
+    </p:spTree>
+    <p:extLst>
+      <p:ext uri="{BB962C8B-B14F-4D97-AF65-F5344CB8AC3E}">
+        <p14:creationId xmlns:p14="http://schemas.microsoft.com/office/powerpoint/2010/main" val="3505442789"/>
+      </p:ext>
+    </p:extLst>
+  </p:cSld>
+  <p:clrMapOvr>
+    <a:masterClrMapping/>
+  </p:clrMapOvr>
+</p:sld>
+</file>
+
+<file path=ppt/slides/slide5.xml><?xml version="1.0" encoding="utf-8"?>
+<p:sld xmlns:a="http://schemas.openxmlformats.org/drawingml/2006/main" xmlns:r="http://schemas.openxmlformats.org/officeDocument/2006/relationships" xmlns:p="http://schemas.openxmlformats.org/presentationml/2006/main">
+  <p:cSld>
+    <p:spTree>
+      <p:nvGrpSpPr>
+        <p:cNvPr id="1" name=""/>
+        <p:cNvGrpSpPr/>
+        <p:nvPr/>
+      </p:nvGrpSpPr>
+      <p:grpSpPr>
+        <a:xfrm>
+          <a:off x="0" y="0"/>
+          <a:ext cx="0" cy="0"/>
+          <a:chOff x="0" y="0"/>
+          <a:chExt cx="0" cy="0"/>
+        </a:xfrm>
+      </p:grpSpPr>
+      <p:sp>
+        <p:nvSpPr>
+          <p:cNvPr id="2" name="Title 1"/>
+          <p:cNvSpPr>
+            <a:spLocks noGrp="1"/>
+          </p:cNvSpPr>
+          <p:nvPr>
+            <p:ph type="title"/>
+          </p:nvPr>
+        </p:nvSpPr>
+        <p:spPr/>
+        <p:txBody>
+          <a:bodyPr/>
+          <a:lstStyle/>
+          <a:p>
+            <a:r>
+              <a:rPr lang="en-US" dirty="0"/>
+              <a:t>The Application</a:t>
             </a:r>
           </a:p>
         </p:txBody>
@@ -3978,7 +6643,7 @@
 </p:sld>
 </file>
 
-<file path=ppt/slides/slide11.xml><?xml version="1.0" encoding="utf-8"?>
+<file path=ppt/slides/slide6.xml><?xml version="1.0" encoding="utf-8"?>
 <p:sld xmlns:a="http://schemas.openxmlformats.org/drawingml/2006/main" xmlns:r="http://schemas.openxmlformats.org/officeDocument/2006/relationships" xmlns:p="http://schemas.openxmlformats.org/presentationml/2006/main">
   <p:cSld>
     <p:spTree>
@@ -4037,7 +6702,7 @@
 </p:sld>
 </file>
 
-<file path=ppt/slides/slide12.xml><?xml version="1.0" encoding="utf-8"?>
+<file path=ppt/slides/slide7.xml><?xml version="1.0" encoding="utf-8"?>
 <p:sld xmlns:a="http://schemas.openxmlformats.org/drawingml/2006/main" xmlns:r="http://schemas.openxmlformats.org/officeDocument/2006/relationships" xmlns:p="http://schemas.openxmlformats.org/presentationml/2006/main">
   <p:cSld>
     <p:spTree>
@@ -4096,7 +6761,7 @@
 </p:sld>
 </file>
 
-<file path=ppt/slides/slide13.xml><?xml version="1.0" encoding="utf-8"?>
+<file path=ppt/slides/slide8.xml><?xml version="1.0" encoding="utf-8"?>
 <p:sld xmlns:a="http://schemas.openxmlformats.org/drawingml/2006/main" xmlns:r="http://schemas.openxmlformats.org/officeDocument/2006/relationships" xmlns:p="http://schemas.openxmlformats.org/presentationml/2006/main">
   <p:cSld>
     <p:spTree>
@@ -4177,1547 +6842,6 @@
 </p:sld>
 </file>
 
-<file path=ppt/slides/slide14.xml><?xml version="1.0" encoding="utf-8"?>
-<p:sld xmlns:a="http://schemas.openxmlformats.org/drawingml/2006/main" xmlns:r="http://schemas.openxmlformats.org/officeDocument/2006/relationships" xmlns:p="http://schemas.openxmlformats.org/presentationml/2006/main">
-  <p:cSld>
-    <p:spTree>
-      <p:nvGrpSpPr>
-        <p:cNvPr id="1" name=""/>
-        <p:cNvGrpSpPr/>
-        <p:nvPr/>
-      </p:nvGrpSpPr>
-      <p:grpSpPr>
-        <a:xfrm>
-          <a:off x="0" y="0"/>
-          <a:ext cx="0" cy="0"/>
-          <a:chOff x="0" y="0"/>
-          <a:chExt cx="0" cy="0"/>
-        </a:xfrm>
-      </p:grpSpPr>
-      <p:sp>
-        <p:nvSpPr>
-          <p:cNvPr id="2" name="Title 1"/>
-          <p:cNvSpPr>
-            <a:spLocks noGrp="1"/>
-          </p:cNvSpPr>
-          <p:nvPr>
-            <p:ph type="title"/>
-          </p:nvPr>
-        </p:nvSpPr>
-        <p:spPr/>
-        <p:txBody>
-          <a:bodyPr/>
-          <a:lstStyle/>
-          <a:p>
-            <a:r>
-              <a:rPr lang="en-US" dirty="0"/>
-              <a:t>View 1: Map</a:t>
-            </a:r>
-          </a:p>
-        </p:txBody>
-      </p:sp>
-    </p:spTree>
-    <p:extLst>
-      <p:ext uri="{BB962C8B-B14F-4D97-AF65-F5344CB8AC3E}">
-        <p14:creationId xmlns:p14="http://schemas.microsoft.com/office/powerpoint/2010/main" val="3143127207"/>
-      </p:ext>
-    </p:extLst>
-  </p:cSld>
-  <p:clrMapOvr>
-    <a:masterClrMapping/>
-  </p:clrMapOvr>
-</p:sld>
-</file>
-
-<file path=ppt/slides/slide15.xml><?xml version="1.0" encoding="utf-8"?>
-<p:sld xmlns:a="http://schemas.openxmlformats.org/drawingml/2006/main" xmlns:r="http://schemas.openxmlformats.org/officeDocument/2006/relationships" xmlns:p="http://schemas.openxmlformats.org/presentationml/2006/main">
-  <p:cSld>
-    <p:spTree>
-      <p:nvGrpSpPr>
-        <p:cNvPr id="1" name=""/>
-        <p:cNvGrpSpPr/>
-        <p:nvPr/>
-      </p:nvGrpSpPr>
-      <p:grpSpPr>
-        <a:xfrm>
-          <a:off x="0" y="0"/>
-          <a:ext cx="0" cy="0"/>
-          <a:chOff x="0" y="0"/>
-          <a:chExt cx="0" cy="0"/>
-        </a:xfrm>
-      </p:grpSpPr>
-      <p:pic>
-        <p:nvPicPr>
-          <p:cNvPr id="4" name="Content Placeholder 3"/>
-          <p:cNvPicPr>
-            <a:picLocks noGrp="1" noChangeAspect="1"/>
-          </p:cNvPicPr>
-          <p:nvPr>
-            <p:ph idx="1"/>
-          </p:nvPr>
-        </p:nvPicPr>
-        <p:blipFill>
-          <a:blip r:embed="rId2">
-            <a:extLst>
-              <a:ext uri="{28A0092B-C50C-407E-A947-70E740481C1C}">
-                <a14:useLocalDpi xmlns:a14="http://schemas.microsoft.com/office/drawing/2010/main" val="0"/>
-              </a:ext>
-            </a:extLst>
-          </a:blip>
-          <a:stretch>
-            <a:fillRect/>
-          </a:stretch>
-        </p:blipFill>
-        <p:spPr>
-          <a:xfrm>
-            <a:off x="0" y="0"/>
-            <a:ext cx="12192000" cy="6858000"/>
-          </a:xfrm>
-        </p:spPr>
-      </p:pic>
-    </p:spTree>
-    <p:extLst>
-      <p:ext uri="{BB962C8B-B14F-4D97-AF65-F5344CB8AC3E}">
-        <p14:creationId xmlns:p14="http://schemas.microsoft.com/office/powerpoint/2010/main" val="3462182744"/>
-      </p:ext>
-    </p:extLst>
-  </p:cSld>
-  <p:clrMapOvr>
-    <a:masterClrMapping/>
-  </p:clrMapOvr>
-</p:sld>
-</file>
-
-<file path=ppt/slides/slide16.xml><?xml version="1.0" encoding="utf-8"?>
-<p:sld xmlns:a="http://schemas.openxmlformats.org/drawingml/2006/main" xmlns:r="http://schemas.openxmlformats.org/officeDocument/2006/relationships" xmlns:p="http://schemas.openxmlformats.org/presentationml/2006/main">
-  <p:cSld>
-    <p:spTree>
-      <p:nvGrpSpPr>
-        <p:cNvPr id="1" name=""/>
-        <p:cNvGrpSpPr/>
-        <p:nvPr/>
-      </p:nvGrpSpPr>
-      <p:grpSpPr>
-        <a:xfrm>
-          <a:off x="0" y="0"/>
-          <a:ext cx="0" cy="0"/>
-          <a:chOff x="0" y="0"/>
-          <a:chExt cx="0" cy="0"/>
-        </a:xfrm>
-      </p:grpSpPr>
-      <p:sp>
-        <p:nvSpPr>
-          <p:cNvPr id="2" name="Title 1"/>
-          <p:cNvSpPr>
-            <a:spLocks noGrp="1"/>
-          </p:cNvSpPr>
-          <p:nvPr>
-            <p:ph type="title"/>
-          </p:nvPr>
-        </p:nvSpPr>
-        <p:spPr/>
-        <p:txBody>
-          <a:bodyPr/>
-          <a:lstStyle/>
-          <a:p>
-            <a:r>
-              <a:rPr lang="en-US" dirty="0"/>
-              <a:t>View 2: Table</a:t>
-            </a:r>
-          </a:p>
-        </p:txBody>
-      </p:sp>
-    </p:spTree>
-    <p:extLst>
-      <p:ext uri="{BB962C8B-B14F-4D97-AF65-F5344CB8AC3E}">
-        <p14:creationId xmlns:p14="http://schemas.microsoft.com/office/powerpoint/2010/main" val="4241321684"/>
-      </p:ext>
-    </p:extLst>
-  </p:cSld>
-  <p:clrMapOvr>
-    <a:masterClrMapping/>
-  </p:clrMapOvr>
-</p:sld>
-</file>
-
-<file path=ppt/slides/slide17.xml><?xml version="1.0" encoding="utf-8"?>
-<p:sld xmlns:a="http://schemas.openxmlformats.org/drawingml/2006/main" xmlns:r="http://schemas.openxmlformats.org/officeDocument/2006/relationships" xmlns:p="http://schemas.openxmlformats.org/presentationml/2006/main">
-  <p:cSld>
-    <p:spTree>
-      <p:nvGrpSpPr>
-        <p:cNvPr id="1" name=""/>
-        <p:cNvGrpSpPr/>
-        <p:nvPr/>
-      </p:nvGrpSpPr>
-      <p:grpSpPr>
-        <a:xfrm>
-          <a:off x="0" y="0"/>
-          <a:ext cx="0" cy="0"/>
-          <a:chOff x="0" y="0"/>
-          <a:chExt cx="0" cy="0"/>
-        </a:xfrm>
-      </p:grpSpPr>
-      <p:pic>
-        <p:nvPicPr>
-          <p:cNvPr id="4" name="Content Placeholder 3"/>
-          <p:cNvPicPr>
-            <a:picLocks noGrp="1" noChangeAspect="1"/>
-          </p:cNvPicPr>
-          <p:nvPr>
-            <p:ph idx="1"/>
-          </p:nvPr>
-        </p:nvPicPr>
-        <p:blipFill>
-          <a:blip r:embed="rId2">
-            <a:extLst>
-              <a:ext uri="{28A0092B-C50C-407E-A947-70E740481C1C}">
-                <a14:useLocalDpi xmlns:a14="http://schemas.microsoft.com/office/drawing/2010/main" val="0"/>
-              </a:ext>
-            </a:extLst>
-          </a:blip>
-          <a:stretch>
-            <a:fillRect/>
-          </a:stretch>
-        </p:blipFill>
-        <p:spPr>
-          <a:xfrm>
-            <a:off x="0" y="-1"/>
-            <a:ext cx="12170893" cy="6858001"/>
-          </a:xfrm>
-        </p:spPr>
-      </p:pic>
-    </p:spTree>
-    <p:extLst>
-      <p:ext uri="{BB962C8B-B14F-4D97-AF65-F5344CB8AC3E}">
-        <p14:creationId xmlns:p14="http://schemas.microsoft.com/office/powerpoint/2010/main" val="1720449951"/>
-      </p:ext>
-    </p:extLst>
-  </p:cSld>
-  <p:clrMapOvr>
-    <a:masterClrMapping/>
-  </p:clrMapOvr>
-</p:sld>
-</file>
-
-<file path=ppt/slides/slide18.xml><?xml version="1.0" encoding="utf-8"?>
-<p:sld xmlns:a="http://schemas.openxmlformats.org/drawingml/2006/main" xmlns:r="http://schemas.openxmlformats.org/officeDocument/2006/relationships" xmlns:p="http://schemas.openxmlformats.org/presentationml/2006/main">
-  <p:cSld>
-    <p:spTree>
-      <p:nvGrpSpPr>
-        <p:cNvPr id="1" name=""/>
-        <p:cNvGrpSpPr/>
-        <p:nvPr/>
-      </p:nvGrpSpPr>
-      <p:grpSpPr>
-        <a:xfrm>
-          <a:off x="0" y="0"/>
-          <a:ext cx="0" cy="0"/>
-          <a:chOff x="0" y="0"/>
-          <a:chExt cx="0" cy="0"/>
-        </a:xfrm>
-      </p:grpSpPr>
-      <p:sp>
-        <p:nvSpPr>
-          <p:cNvPr id="2" name="Title 1"/>
-          <p:cNvSpPr>
-            <a:spLocks noGrp="1"/>
-          </p:cNvSpPr>
-          <p:nvPr>
-            <p:ph type="title"/>
-          </p:nvPr>
-        </p:nvSpPr>
-        <p:spPr/>
-        <p:txBody>
-          <a:bodyPr/>
-          <a:lstStyle/>
-          <a:p>
-            <a:r>
-              <a:rPr lang="en-US" dirty="0"/>
-              <a:t>View 3: </a:t>
-            </a:r>
-            <a:r>
-              <a:rPr lang="en-US" dirty="0" err="1"/>
-              <a:t>Heatmap</a:t>
-            </a:r>
-            <a:endParaRPr lang="en-US" dirty="0"/>
-          </a:p>
-        </p:txBody>
-      </p:sp>
-      <p:sp>
-        <p:nvSpPr>
-          <p:cNvPr id="3" name="Content Placeholder 2"/>
-          <p:cNvSpPr>
-            <a:spLocks noGrp="1"/>
-          </p:cNvSpPr>
-          <p:nvPr>
-            <p:ph idx="1"/>
-          </p:nvPr>
-        </p:nvSpPr>
-        <p:spPr/>
-        <p:txBody>
-          <a:bodyPr/>
-          <a:lstStyle/>
-          <a:p>
-            <a:endParaRPr lang="en-US"/>
-          </a:p>
-        </p:txBody>
-      </p:sp>
-    </p:spTree>
-    <p:extLst>
-      <p:ext uri="{BB962C8B-B14F-4D97-AF65-F5344CB8AC3E}">
-        <p14:creationId xmlns:p14="http://schemas.microsoft.com/office/powerpoint/2010/main" val="3575549951"/>
-      </p:ext>
-    </p:extLst>
-  </p:cSld>
-  <p:clrMapOvr>
-    <a:masterClrMapping/>
-  </p:clrMapOvr>
-</p:sld>
-</file>
-
-<file path=ppt/slides/slide19.xml><?xml version="1.0" encoding="utf-8"?>
-<p:sld xmlns:a="http://schemas.openxmlformats.org/drawingml/2006/main" xmlns:r="http://schemas.openxmlformats.org/officeDocument/2006/relationships" xmlns:p="http://schemas.openxmlformats.org/presentationml/2006/main">
-  <p:cSld>
-    <p:spTree>
-      <p:nvGrpSpPr>
-        <p:cNvPr id="1" name=""/>
-        <p:cNvGrpSpPr/>
-        <p:nvPr/>
-      </p:nvGrpSpPr>
-      <p:grpSpPr>
-        <a:xfrm>
-          <a:off x="0" y="0"/>
-          <a:ext cx="0" cy="0"/>
-          <a:chOff x="0" y="0"/>
-          <a:chExt cx="0" cy="0"/>
-        </a:xfrm>
-      </p:grpSpPr>
-      <p:pic>
-        <p:nvPicPr>
-          <p:cNvPr id="4" name="Content Placeholder 3"/>
-          <p:cNvPicPr>
-            <a:picLocks noGrp="1" noChangeAspect="1"/>
-          </p:cNvPicPr>
-          <p:nvPr>
-            <p:ph idx="1"/>
-          </p:nvPr>
-        </p:nvPicPr>
-        <p:blipFill>
-          <a:blip r:embed="rId2">
-            <a:extLst>
-              <a:ext uri="{28A0092B-C50C-407E-A947-70E740481C1C}">
-                <a14:useLocalDpi xmlns:a14="http://schemas.microsoft.com/office/drawing/2010/main" val="0"/>
-              </a:ext>
-            </a:extLst>
-          </a:blip>
-          <a:stretch>
-            <a:fillRect/>
-          </a:stretch>
-        </p:blipFill>
-        <p:spPr>
-          <a:xfrm>
-            <a:off x="1" y="0"/>
-            <a:ext cx="12192000" cy="6870149"/>
-          </a:xfrm>
-        </p:spPr>
-      </p:pic>
-    </p:spTree>
-    <p:extLst>
-      <p:ext uri="{BB962C8B-B14F-4D97-AF65-F5344CB8AC3E}">
-        <p14:creationId xmlns:p14="http://schemas.microsoft.com/office/powerpoint/2010/main" val="590599887"/>
-      </p:ext>
-    </p:extLst>
-  </p:cSld>
-  <p:clrMapOvr>
-    <a:masterClrMapping/>
-  </p:clrMapOvr>
-</p:sld>
-</file>
-
-<file path=ppt/slides/slide2.xml><?xml version="1.0" encoding="utf-8"?>
-<p:sld xmlns:a="http://schemas.openxmlformats.org/drawingml/2006/main" xmlns:r="http://schemas.openxmlformats.org/officeDocument/2006/relationships" xmlns:p="http://schemas.openxmlformats.org/presentationml/2006/main">
-  <p:cSld>
-    <p:spTree>
-      <p:nvGrpSpPr>
-        <p:cNvPr id="1" name=""/>
-        <p:cNvGrpSpPr/>
-        <p:nvPr/>
-      </p:nvGrpSpPr>
-      <p:grpSpPr>
-        <a:xfrm>
-          <a:off x="0" y="0"/>
-          <a:ext cx="0" cy="0"/>
-          <a:chOff x="0" y="0"/>
-          <a:chExt cx="0" cy="0"/>
-        </a:xfrm>
-      </p:grpSpPr>
-      <p:sp>
-        <p:nvSpPr>
-          <p:cNvPr id="2" name="Title 1"/>
-          <p:cNvSpPr>
-            <a:spLocks noGrp="1"/>
-          </p:cNvSpPr>
-          <p:nvPr>
-            <p:ph type="title"/>
-          </p:nvPr>
-        </p:nvSpPr>
-        <p:spPr/>
-        <p:txBody>
-          <a:bodyPr/>
-          <a:lstStyle/>
-          <a:p>
-            <a:r>
-              <a:rPr lang="en-US" dirty="0"/>
-              <a:t>Problem</a:t>
-            </a:r>
-          </a:p>
-        </p:txBody>
-      </p:sp>
-      <p:sp>
-        <p:nvSpPr>
-          <p:cNvPr id="3" name="Content Placeholder 2"/>
-          <p:cNvSpPr>
-            <a:spLocks noGrp="1"/>
-          </p:cNvSpPr>
-          <p:nvPr>
-            <p:ph idx="1"/>
-          </p:nvPr>
-        </p:nvSpPr>
-        <p:spPr/>
-        <p:txBody>
-          <a:bodyPr>
-            <a:normAutofit/>
-          </a:bodyPr>
-          <a:lstStyle/>
-          <a:p>
-            <a:r>
-              <a:rPr lang="en-US" sz="2800" dirty="0"/>
-              <a:t>Crime is an ever-present issue</a:t>
-            </a:r>
-          </a:p>
-          <a:p>
-            <a:r>
-              <a:rPr lang="en-US" sz="2800" dirty="0"/>
-              <a:t>Dozens of crimes committed everyday are just added on top of a giant “pile” of data</a:t>
-            </a:r>
-          </a:p>
-          <a:p>
-            <a:r>
-              <a:rPr lang="en-US" sz="2800" dirty="0"/>
-              <a:t>Much of this data is textual in nature</a:t>
-            </a:r>
-          </a:p>
-          <a:p>
-            <a:pPr lvl="1"/>
-            <a:r>
-              <a:rPr lang="en-US" sz="2800" dirty="0"/>
-              <a:t>Location values</a:t>
-            </a:r>
-          </a:p>
-          <a:p>
-            <a:pPr lvl="1"/>
-            <a:r>
-              <a:rPr lang="en-US" sz="2800" dirty="0"/>
-              <a:t>Date/Time data</a:t>
-            </a:r>
-          </a:p>
-          <a:p>
-            <a:r>
-              <a:rPr lang="en-US" sz="2800" dirty="0"/>
-              <a:t>Need a way to visualize this data</a:t>
-            </a:r>
-          </a:p>
-        </p:txBody>
-      </p:sp>
-    </p:spTree>
-    <p:extLst>
-      <p:ext uri="{BB962C8B-B14F-4D97-AF65-F5344CB8AC3E}">
-        <p14:creationId xmlns:p14="http://schemas.microsoft.com/office/powerpoint/2010/main" val="2905820242"/>
-      </p:ext>
-    </p:extLst>
-  </p:cSld>
-  <p:clrMapOvr>
-    <a:masterClrMapping/>
-  </p:clrMapOvr>
-</p:sld>
-</file>
-
-<file path=ppt/slides/slide20.xml><?xml version="1.0" encoding="utf-8"?>
-<p:sld xmlns:a="http://schemas.openxmlformats.org/drawingml/2006/main" xmlns:r="http://schemas.openxmlformats.org/officeDocument/2006/relationships" xmlns:p="http://schemas.openxmlformats.org/presentationml/2006/main">
-  <p:cSld>
-    <p:spTree>
-      <p:nvGrpSpPr>
-        <p:cNvPr id="1" name=""/>
-        <p:cNvGrpSpPr/>
-        <p:nvPr/>
-      </p:nvGrpSpPr>
-      <p:grpSpPr>
-        <a:xfrm>
-          <a:off x="0" y="0"/>
-          <a:ext cx="0" cy="0"/>
-          <a:chOff x="0" y="0"/>
-          <a:chExt cx="0" cy="0"/>
-        </a:xfrm>
-      </p:grpSpPr>
-      <p:sp>
-        <p:nvSpPr>
-          <p:cNvPr id="2" name="Title 1"/>
-          <p:cNvSpPr>
-            <a:spLocks noGrp="1"/>
-          </p:cNvSpPr>
-          <p:nvPr>
-            <p:ph type="title"/>
-          </p:nvPr>
-        </p:nvSpPr>
-        <p:spPr/>
-        <p:txBody>
-          <a:bodyPr/>
-          <a:lstStyle/>
-          <a:p>
-            <a:r>
-              <a:rPr lang="en-US" dirty="0"/>
-              <a:t>View 4: </a:t>
-            </a:r>
-            <a:r>
-              <a:rPr lang="en-US" dirty="0" err="1"/>
-              <a:t>Bargraph</a:t>
-            </a:r>
-            <a:endParaRPr lang="en-US" dirty="0"/>
-          </a:p>
-        </p:txBody>
-      </p:sp>
-    </p:spTree>
-    <p:extLst>
-      <p:ext uri="{BB962C8B-B14F-4D97-AF65-F5344CB8AC3E}">
-        <p14:creationId xmlns:p14="http://schemas.microsoft.com/office/powerpoint/2010/main" val="2541222981"/>
-      </p:ext>
-    </p:extLst>
-  </p:cSld>
-  <p:clrMapOvr>
-    <a:masterClrMapping/>
-  </p:clrMapOvr>
-</p:sld>
-</file>
-
-<file path=ppt/slides/slide21.xml><?xml version="1.0" encoding="utf-8"?>
-<p:sld xmlns:a="http://schemas.openxmlformats.org/drawingml/2006/main" xmlns:r="http://schemas.openxmlformats.org/officeDocument/2006/relationships" xmlns:p="http://schemas.openxmlformats.org/presentationml/2006/main">
-  <p:cSld>
-    <p:spTree>
-      <p:nvGrpSpPr>
-        <p:cNvPr id="1" name=""/>
-        <p:cNvGrpSpPr/>
-        <p:nvPr/>
-      </p:nvGrpSpPr>
-      <p:grpSpPr>
-        <a:xfrm>
-          <a:off x="0" y="0"/>
-          <a:ext cx="0" cy="0"/>
-          <a:chOff x="0" y="0"/>
-          <a:chExt cx="0" cy="0"/>
-        </a:xfrm>
-      </p:grpSpPr>
-      <p:pic>
-        <p:nvPicPr>
-          <p:cNvPr id="4" name="Content Placeholder 3"/>
-          <p:cNvPicPr>
-            <a:picLocks noGrp="1" noChangeAspect="1"/>
-          </p:cNvPicPr>
-          <p:nvPr>
-            <p:ph idx="1"/>
-          </p:nvPr>
-        </p:nvPicPr>
-        <p:blipFill>
-          <a:blip r:embed="rId2">
-            <a:extLst>
-              <a:ext uri="{28A0092B-C50C-407E-A947-70E740481C1C}">
-                <a14:useLocalDpi xmlns:a14="http://schemas.microsoft.com/office/drawing/2010/main" val="0"/>
-              </a:ext>
-            </a:extLst>
-          </a:blip>
-          <a:stretch>
-            <a:fillRect/>
-          </a:stretch>
-        </p:blipFill>
-        <p:spPr>
-          <a:xfrm>
-            <a:off x="0" y="0"/>
-            <a:ext cx="12192000" cy="6861538"/>
-          </a:xfrm>
-        </p:spPr>
-      </p:pic>
-    </p:spTree>
-    <p:extLst>
-      <p:ext uri="{BB962C8B-B14F-4D97-AF65-F5344CB8AC3E}">
-        <p14:creationId xmlns:p14="http://schemas.microsoft.com/office/powerpoint/2010/main" val="1094535255"/>
-      </p:ext>
-    </p:extLst>
-  </p:cSld>
-  <p:clrMapOvr>
-    <a:masterClrMapping/>
-  </p:clrMapOvr>
-</p:sld>
-</file>
-
-<file path=ppt/slides/slide22.xml><?xml version="1.0" encoding="utf-8"?>
-<p:sld xmlns:a="http://schemas.openxmlformats.org/drawingml/2006/main" xmlns:r="http://schemas.openxmlformats.org/officeDocument/2006/relationships" xmlns:p="http://schemas.openxmlformats.org/presentationml/2006/main">
-  <p:cSld>
-    <p:spTree>
-      <p:nvGrpSpPr>
-        <p:cNvPr id="1" name=""/>
-        <p:cNvGrpSpPr/>
-        <p:nvPr/>
-      </p:nvGrpSpPr>
-      <p:grpSpPr>
-        <a:xfrm>
-          <a:off x="0" y="0"/>
-          <a:ext cx="0" cy="0"/>
-          <a:chOff x="0" y="0"/>
-          <a:chExt cx="0" cy="0"/>
-        </a:xfrm>
-      </p:grpSpPr>
-      <p:sp>
-        <p:nvSpPr>
-          <p:cNvPr id="2" name="Title 1"/>
-          <p:cNvSpPr>
-            <a:spLocks noGrp="1"/>
-          </p:cNvSpPr>
-          <p:nvPr>
-            <p:ph type="title"/>
-          </p:nvPr>
-        </p:nvSpPr>
-        <p:spPr/>
-        <p:txBody>
-          <a:bodyPr/>
-          <a:lstStyle/>
-          <a:p>
-            <a:r>
-              <a:rPr lang="en-US" dirty="0"/>
-              <a:t>Challenges</a:t>
-            </a:r>
-          </a:p>
-        </p:txBody>
-      </p:sp>
-      <p:sp>
-        <p:nvSpPr>
-          <p:cNvPr id="3" name="Content Placeholder 2"/>
-          <p:cNvSpPr>
-            <a:spLocks noGrp="1"/>
-          </p:cNvSpPr>
-          <p:nvPr>
-            <p:ph idx="1"/>
-          </p:nvPr>
-        </p:nvSpPr>
-        <p:spPr/>
-        <p:txBody>
-          <a:bodyPr>
-            <a:normAutofit/>
-          </a:bodyPr>
-          <a:lstStyle/>
-          <a:p>
-            <a:r>
-              <a:rPr lang="en-US" sz="2800" dirty="0"/>
-              <a:t>Deciding the purpose and scope of the project</a:t>
-            </a:r>
-          </a:p>
-          <a:p>
-            <a:pPr lvl="1"/>
-            <a:r>
-              <a:rPr lang="en-US" sz="2600" dirty="0"/>
-              <a:t>Many different dimensions of data allows for almost limitless inquiry</a:t>
-            </a:r>
-          </a:p>
-          <a:p>
-            <a:r>
-              <a:rPr lang="en-US" sz="2800" dirty="0"/>
-              <a:t>Dataset was very large, performance was always a concern</a:t>
-            </a:r>
-          </a:p>
-          <a:p>
-            <a:pPr lvl="1"/>
-            <a:r>
-              <a:rPr lang="en-US" sz="2800" dirty="0"/>
-              <a:t>Memory consumption</a:t>
-            </a:r>
-          </a:p>
-          <a:p>
-            <a:pPr lvl="1"/>
-            <a:r>
-              <a:rPr lang="en-US" sz="2800" dirty="0"/>
-              <a:t>Computational performance</a:t>
-            </a:r>
-          </a:p>
-          <a:p>
-            <a:r>
-              <a:rPr lang="en-US" sz="2800" dirty="0"/>
-              <a:t>Diverse software stack complicated communication between modules</a:t>
-            </a:r>
-          </a:p>
-        </p:txBody>
-      </p:sp>
-    </p:spTree>
-    <p:extLst>
-      <p:ext uri="{BB962C8B-B14F-4D97-AF65-F5344CB8AC3E}">
-        <p14:creationId xmlns:p14="http://schemas.microsoft.com/office/powerpoint/2010/main" val="1888555791"/>
-      </p:ext>
-    </p:extLst>
-  </p:cSld>
-  <p:clrMapOvr>
-    <a:masterClrMapping/>
-  </p:clrMapOvr>
-</p:sld>
-</file>
-
-<file path=ppt/slides/slide23.xml><?xml version="1.0" encoding="utf-8"?>
-<p:sld xmlns:a="http://schemas.openxmlformats.org/drawingml/2006/main" xmlns:r="http://schemas.openxmlformats.org/officeDocument/2006/relationships" xmlns:p="http://schemas.openxmlformats.org/presentationml/2006/main">
-  <p:cSld>
-    <p:spTree>
-      <p:nvGrpSpPr>
-        <p:cNvPr id="1" name=""/>
-        <p:cNvGrpSpPr/>
-        <p:nvPr/>
-      </p:nvGrpSpPr>
-      <p:grpSpPr>
-        <a:xfrm>
-          <a:off x="0" y="0"/>
-          <a:ext cx="0" cy="0"/>
-          <a:chOff x="0" y="0"/>
-          <a:chExt cx="0" cy="0"/>
-        </a:xfrm>
-      </p:grpSpPr>
-      <p:sp>
-        <p:nvSpPr>
-          <p:cNvPr id="2" name="Title 1"/>
-          <p:cNvSpPr>
-            <a:spLocks noGrp="1"/>
-          </p:cNvSpPr>
-          <p:nvPr>
-            <p:ph type="title"/>
-          </p:nvPr>
-        </p:nvSpPr>
-        <p:spPr/>
-        <p:txBody>
-          <a:bodyPr/>
-          <a:lstStyle/>
-          <a:p>
-            <a:r>
-              <a:rPr lang="en-US" dirty="0"/>
-              <a:t>Future Work</a:t>
-            </a:r>
-          </a:p>
-        </p:txBody>
-      </p:sp>
-      <p:sp>
-        <p:nvSpPr>
-          <p:cNvPr id="3" name="Content Placeholder 2"/>
-          <p:cNvSpPr>
-            <a:spLocks noGrp="1"/>
-          </p:cNvSpPr>
-          <p:nvPr>
-            <p:ph idx="1"/>
-          </p:nvPr>
-        </p:nvSpPr>
-        <p:spPr/>
-        <p:txBody>
-          <a:bodyPr>
-            <a:normAutofit/>
-          </a:bodyPr>
-          <a:lstStyle/>
-          <a:p>
-            <a:r>
-              <a:rPr lang="en-US" sz="2800" dirty="0"/>
-              <a:t>Warn user when requesting a large number of API results</a:t>
-            </a:r>
-          </a:p>
-          <a:p>
-            <a:r>
-              <a:rPr lang="en-US" sz="2800" dirty="0"/>
-              <a:t>Differentiate clustered markers with same location</a:t>
-            </a:r>
-          </a:p>
-          <a:p>
-            <a:r>
-              <a:rPr lang="en-US" sz="2800" dirty="0"/>
-              <a:t>Add a view which organizes crimes according to when they occurred</a:t>
-            </a:r>
-          </a:p>
-          <a:p>
-            <a:r>
-              <a:rPr lang="en-US" sz="2800" dirty="0"/>
-              <a:t>Qualitative user study</a:t>
-            </a:r>
-          </a:p>
-        </p:txBody>
-      </p:sp>
-    </p:spTree>
-    <p:extLst>
-      <p:ext uri="{BB962C8B-B14F-4D97-AF65-F5344CB8AC3E}">
-        <p14:creationId xmlns:p14="http://schemas.microsoft.com/office/powerpoint/2010/main" val="1973424099"/>
-      </p:ext>
-    </p:extLst>
-  </p:cSld>
-  <p:clrMapOvr>
-    <a:masterClrMapping/>
-  </p:clrMapOvr>
-</p:sld>
-</file>
-
-<file path=ppt/slides/slide24.xml><?xml version="1.0" encoding="utf-8"?>
-<p:sld xmlns:a="http://schemas.openxmlformats.org/drawingml/2006/main" xmlns:r="http://schemas.openxmlformats.org/officeDocument/2006/relationships" xmlns:p="http://schemas.openxmlformats.org/presentationml/2006/main">
-  <p:cSld>
-    <p:spTree>
-      <p:nvGrpSpPr>
-        <p:cNvPr id="1" name=""/>
-        <p:cNvGrpSpPr/>
-        <p:nvPr/>
-      </p:nvGrpSpPr>
-      <p:grpSpPr>
-        <a:xfrm>
-          <a:off x="0" y="0"/>
-          <a:ext cx="0" cy="0"/>
-          <a:chOff x="0" y="0"/>
-          <a:chExt cx="0" cy="0"/>
-        </a:xfrm>
-      </p:grpSpPr>
-      <p:sp>
-        <p:nvSpPr>
-          <p:cNvPr id="2" name="Title 1"/>
-          <p:cNvSpPr>
-            <a:spLocks noGrp="1"/>
-          </p:cNvSpPr>
-          <p:nvPr>
-            <p:ph type="title"/>
-          </p:nvPr>
-        </p:nvSpPr>
-        <p:spPr/>
-        <p:txBody>
-          <a:bodyPr/>
-          <a:lstStyle/>
-          <a:p>
-            <a:r>
-              <a:rPr lang="en-US" dirty="0"/>
-              <a:t>Conclusions</a:t>
-            </a:r>
-          </a:p>
-        </p:txBody>
-      </p:sp>
-      <p:sp>
-        <p:nvSpPr>
-          <p:cNvPr id="3" name="Content Placeholder 2"/>
-          <p:cNvSpPr>
-            <a:spLocks noGrp="1"/>
-          </p:cNvSpPr>
-          <p:nvPr>
-            <p:ph idx="1"/>
-          </p:nvPr>
-        </p:nvSpPr>
-        <p:spPr/>
-        <p:txBody>
-          <a:bodyPr>
-            <a:normAutofit/>
-          </a:bodyPr>
-          <a:lstStyle/>
-          <a:p>
-            <a:r>
-              <a:rPr lang="en-US" sz="2800" dirty="0"/>
-              <a:t>Many different pieces went into building this application</a:t>
-            </a:r>
-          </a:p>
-          <a:p>
-            <a:r>
-              <a:rPr lang="en-US" sz="2800" dirty="0"/>
-              <a:t>Server is key to performance when working with lots of data</a:t>
-            </a:r>
-          </a:p>
-          <a:p>
-            <a:r>
-              <a:rPr lang="en-US" sz="2800" dirty="0"/>
-              <a:t>Must be judicious with what pieces of the data you want to visualize</a:t>
-            </a:r>
-          </a:p>
-          <a:p>
-            <a:r>
-              <a:rPr lang="en-US" sz="2800" dirty="0"/>
-              <a:t>Different views are useful for focusing what you want to show</a:t>
-            </a:r>
-          </a:p>
-          <a:p>
-            <a:endParaRPr lang="en-US" sz="2800" dirty="0"/>
-          </a:p>
-        </p:txBody>
-      </p:sp>
-    </p:spTree>
-    <p:extLst>
-      <p:ext uri="{BB962C8B-B14F-4D97-AF65-F5344CB8AC3E}">
-        <p14:creationId xmlns:p14="http://schemas.microsoft.com/office/powerpoint/2010/main" val="1713656803"/>
-      </p:ext>
-    </p:extLst>
-  </p:cSld>
-  <p:clrMapOvr>
-    <a:masterClrMapping/>
-  </p:clrMapOvr>
-</p:sld>
-</file>
-
-<file path=ppt/slides/slide25.xml><?xml version="1.0" encoding="utf-8"?>
-<p:sld xmlns:a="http://schemas.openxmlformats.org/drawingml/2006/main" xmlns:r="http://schemas.openxmlformats.org/officeDocument/2006/relationships" xmlns:p="http://schemas.openxmlformats.org/presentationml/2006/main">
-  <p:cSld>
-    <p:spTree>
-      <p:nvGrpSpPr>
-        <p:cNvPr id="1" name=""/>
-        <p:cNvGrpSpPr/>
-        <p:nvPr/>
-      </p:nvGrpSpPr>
-      <p:grpSpPr>
-        <a:xfrm>
-          <a:off x="0" y="0"/>
-          <a:ext cx="0" cy="0"/>
-          <a:chOff x="0" y="0"/>
-          <a:chExt cx="0" cy="0"/>
-        </a:xfrm>
-      </p:grpSpPr>
-      <p:sp>
-        <p:nvSpPr>
-          <p:cNvPr id="2" name="Title 1"/>
-          <p:cNvSpPr>
-            <a:spLocks noGrp="1"/>
-          </p:cNvSpPr>
-          <p:nvPr>
-            <p:ph type="title"/>
-          </p:nvPr>
-        </p:nvSpPr>
-        <p:spPr/>
-        <p:txBody>
-          <a:bodyPr/>
-          <a:lstStyle/>
-          <a:p>
-            <a:r>
-              <a:rPr lang="en-US" dirty="0"/>
-              <a:t>Questions?</a:t>
-            </a:r>
-          </a:p>
-        </p:txBody>
-      </p:sp>
-    </p:spTree>
-    <p:extLst>
-      <p:ext uri="{BB962C8B-B14F-4D97-AF65-F5344CB8AC3E}">
-        <p14:creationId xmlns:p14="http://schemas.microsoft.com/office/powerpoint/2010/main" val="2854765581"/>
-      </p:ext>
-    </p:extLst>
-  </p:cSld>
-  <p:clrMapOvr>
-    <a:masterClrMapping/>
-  </p:clrMapOvr>
-</p:sld>
-</file>
-
-<file path=ppt/slides/slide3.xml><?xml version="1.0" encoding="utf-8"?>
-<p:sld xmlns:a="http://schemas.openxmlformats.org/drawingml/2006/main" xmlns:r="http://schemas.openxmlformats.org/officeDocument/2006/relationships" xmlns:p="http://schemas.openxmlformats.org/presentationml/2006/main">
-  <p:cSld>
-    <p:spTree>
-      <p:nvGrpSpPr>
-        <p:cNvPr id="1" name=""/>
-        <p:cNvGrpSpPr/>
-        <p:nvPr/>
-      </p:nvGrpSpPr>
-      <p:grpSpPr>
-        <a:xfrm>
-          <a:off x="0" y="0"/>
-          <a:ext cx="0" cy="0"/>
-          <a:chOff x="0" y="0"/>
-          <a:chExt cx="0" cy="0"/>
-        </a:xfrm>
-      </p:grpSpPr>
-      <p:sp>
-        <p:nvSpPr>
-          <p:cNvPr id="2" name="Title 1"/>
-          <p:cNvSpPr>
-            <a:spLocks noGrp="1"/>
-          </p:cNvSpPr>
-          <p:nvPr>
-            <p:ph type="title"/>
-          </p:nvPr>
-        </p:nvSpPr>
-        <p:spPr/>
-        <p:txBody>
-          <a:bodyPr/>
-          <a:lstStyle/>
-          <a:p>
-            <a:r>
-              <a:rPr lang="en-US" dirty="0"/>
-              <a:t>Audience</a:t>
-            </a:r>
-          </a:p>
-        </p:txBody>
-      </p:sp>
-      <p:sp>
-        <p:nvSpPr>
-          <p:cNvPr id="3" name="Content Placeholder 2"/>
-          <p:cNvSpPr>
-            <a:spLocks noGrp="1"/>
-          </p:cNvSpPr>
-          <p:nvPr>
-            <p:ph idx="1"/>
-          </p:nvPr>
-        </p:nvSpPr>
-        <p:spPr/>
-        <p:txBody>
-          <a:bodyPr>
-            <a:normAutofit/>
-          </a:bodyPr>
-          <a:lstStyle/>
-          <a:p>
-            <a:r>
-              <a:rPr lang="en-US" sz="2800" dirty="0"/>
-              <a:t>Targeted a general audience</a:t>
-            </a:r>
-          </a:p>
-          <a:p>
-            <a:r>
-              <a:rPr lang="en-US" sz="2800" dirty="0"/>
-              <a:t>Wanted views to be plain and easy to understand</a:t>
-            </a:r>
-          </a:p>
-          <a:p>
-            <a:r>
-              <a:rPr lang="en-US" sz="2800" dirty="0"/>
-              <a:t>Also wanted users to be able to dive into and explore the data</a:t>
-            </a:r>
-          </a:p>
-          <a:p>
-            <a:r>
-              <a:rPr lang="en-US" sz="2800" dirty="0">
-                <a:solidFill>
-                  <a:srgbClr val="FFFF00"/>
-                </a:solidFill>
-              </a:rPr>
-              <a:t>Can be used by other people</a:t>
-            </a:r>
-          </a:p>
-        </p:txBody>
-      </p:sp>
-    </p:spTree>
-    <p:extLst>
-      <p:ext uri="{BB962C8B-B14F-4D97-AF65-F5344CB8AC3E}">
-        <p14:creationId xmlns:p14="http://schemas.microsoft.com/office/powerpoint/2010/main" val="49346205"/>
-      </p:ext>
-    </p:extLst>
-  </p:cSld>
-  <p:clrMapOvr>
-    <a:masterClrMapping/>
-  </p:clrMapOvr>
-</p:sld>
-</file>
-
-<file path=ppt/slides/slide4.xml><?xml version="1.0" encoding="utf-8"?>
-<p:sld xmlns:a="http://schemas.openxmlformats.org/drawingml/2006/main" xmlns:r="http://schemas.openxmlformats.org/officeDocument/2006/relationships" xmlns:p="http://schemas.openxmlformats.org/presentationml/2006/main">
-  <p:cSld>
-    <p:spTree>
-      <p:nvGrpSpPr>
-        <p:cNvPr id="1" name=""/>
-        <p:cNvGrpSpPr/>
-        <p:nvPr/>
-      </p:nvGrpSpPr>
-      <p:grpSpPr>
-        <a:xfrm>
-          <a:off x="0" y="0"/>
-          <a:ext cx="0" cy="0"/>
-          <a:chOff x="0" y="0"/>
-          <a:chExt cx="0" cy="0"/>
-        </a:xfrm>
-      </p:grpSpPr>
-      <p:sp>
-        <p:nvSpPr>
-          <p:cNvPr id="2" name="Title 1"/>
-          <p:cNvSpPr>
-            <a:spLocks noGrp="1"/>
-          </p:cNvSpPr>
-          <p:nvPr>
-            <p:ph type="title"/>
-          </p:nvPr>
-        </p:nvSpPr>
-        <p:spPr/>
-        <p:txBody>
-          <a:bodyPr/>
-          <a:lstStyle/>
-          <a:p>
-            <a:r>
-              <a:rPr lang="en-US" dirty="0"/>
-              <a:t>Dataset</a:t>
-            </a:r>
-          </a:p>
-        </p:txBody>
-      </p:sp>
-      <p:sp>
-        <p:nvSpPr>
-          <p:cNvPr id="3" name="Content Placeholder 2"/>
-          <p:cNvSpPr>
-            <a:spLocks noGrp="1"/>
-          </p:cNvSpPr>
-          <p:nvPr>
-            <p:ph idx="1"/>
-          </p:nvPr>
-        </p:nvSpPr>
-        <p:spPr>
-          <a:xfrm>
-            <a:off x="1097280" y="1845733"/>
-            <a:ext cx="10058400" cy="4211117"/>
-          </a:xfrm>
-        </p:spPr>
-        <p:txBody>
-          <a:bodyPr>
-            <a:normAutofit/>
-          </a:bodyPr>
-          <a:lstStyle/>
-          <a:p>
-            <a:r>
-              <a:rPr lang="en-US" sz="2800" dirty="0"/>
-              <a:t>Consists of reported criminal activity within the city limits of Chicago, Illinois</a:t>
-            </a:r>
-          </a:p>
-          <a:p>
-            <a:r>
-              <a:rPr lang="en-US" sz="2800" dirty="0"/>
-              <a:t>Each data element represents a single reported crime</a:t>
-            </a:r>
-          </a:p>
-          <a:p>
-            <a:pPr lvl="1"/>
-            <a:r>
-              <a:rPr lang="en-US" sz="2600" dirty="0"/>
-              <a:t>Except homicides which are divided in to crimes/victim</a:t>
-            </a:r>
-          </a:p>
-          <a:p>
-            <a:r>
-              <a:rPr lang="en-US" sz="2800" dirty="0"/>
-              <a:t>Each row value consists of several column values</a:t>
-            </a:r>
-          </a:p>
-          <a:p>
-            <a:pPr lvl="1"/>
-            <a:r>
-              <a:rPr lang="en-US" sz="2600" dirty="0"/>
-              <a:t>Crime type</a:t>
-            </a:r>
-          </a:p>
-          <a:p>
-            <a:pPr lvl="1"/>
-            <a:r>
-              <a:rPr lang="en-US" sz="2600" dirty="0"/>
-              <a:t>Latitude/Longitude where crime occurred</a:t>
-            </a:r>
-          </a:p>
-          <a:p>
-            <a:pPr lvl="1"/>
-            <a:r>
-              <a:rPr lang="en-US" sz="2600" dirty="0"/>
-              <a:t>Chicago community area</a:t>
-            </a:r>
-          </a:p>
-          <a:p>
-            <a:pPr lvl="1"/>
-            <a:r>
-              <a:rPr lang="en-US" sz="2600" dirty="0"/>
-              <a:t>Date/Time when crime occurred</a:t>
-            </a:r>
-          </a:p>
-        </p:txBody>
-      </p:sp>
-    </p:spTree>
-    <p:extLst>
-      <p:ext uri="{BB962C8B-B14F-4D97-AF65-F5344CB8AC3E}">
-        <p14:creationId xmlns:p14="http://schemas.microsoft.com/office/powerpoint/2010/main" val="3505442789"/>
-      </p:ext>
-    </p:extLst>
-  </p:cSld>
-  <p:clrMapOvr>
-    <a:masterClrMapping/>
-  </p:clrMapOvr>
-</p:sld>
-</file>
-
-<file path=ppt/slides/slide5.xml><?xml version="1.0" encoding="utf-8"?>
-<p:sld xmlns:a="http://schemas.openxmlformats.org/drawingml/2006/main" xmlns:r="http://schemas.openxmlformats.org/officeDocument/2006/relationships" xmlns:p="http://schemas.openxmlformats.org/presentationml/2006/main">
-  <p:cSld>
-    <p:spTree>
-      <p:nvGrpSpPr>
-        <p:cNvPr id="1" name=""/>
-        <p:cNvGrpSpPr/>
-        <p:nvPr/>
-      </p:nvGrpSpPr>
-      <p:grpSpPr>
-        <a:xfrm>
-          <a:off x="0" y="0"/>
-          <a:ext cx="0" cy="0"/>
-          <a:chOff x="0" y="0"/>
-          <a:chExt cx="0" cy="0"/>
-        </a:xfrm>
-      </p:grpSpPr>
-      <p:sp>
-        <p:nvSpPr>
-          <p:cNvPr id="2" name="Title 1"/>
-          <p:cNvSpPr>
-            <a:spLocks noGrp="1"/>
-          </p:cNvSpPr>
-          <p:nvPr>
-            <p:ph type="title"/>
-          </p:nvPr>
-        </p:nvSpPr>
-        <p:spPr/>
-        <p:txBody>
-          <a:bodyPr/>
-          <a:lstStyle/>
-          <a:p>
-            <a:r>
-              <a:rPr lang="en-US" dirty="0"/>
-              <a:t>Project Stack</a:t>
-            </a:r>
-          </a:p>
-        </p:txBody>
-      </p:sp>
-      <p:sp>
-        <p:nvSpPr>
-          <p:cNvPr id="3" name="Content Placeholder 2"/>
-          <p:cNvSpPr>
-            <a:spLocks noGrp="1"/>
-          </p:cNvSpPr>
-          <p:nvPr>
-            <p:ph idx="1"/>
-          </p:nvPr>
-        </p:nvSpPr>
-        <p:spPr/>
-        <p:txBody>
-          <a:bodyPr>
-            <a:noAutofit/>
-          </a:bodyPr>
-          <a:lstStyle/>
-          <a:p>
-            <a:r>
-              <a:rPr lang="en-US" sz="2800" dirty="0"/>
-              <a:t>Frontend: AngularJS with JavaScript and HTML</a:t>
-            </a:r>
-          </a:p>
-          <a:p>
-            <a:pPr lvl="1"/>
-            <a:r>
-              <a:rPr lang="en-US" sz="2800" dirty="0"/>
-              <a:t>Controller provides layer between view and data</a:t>
-            </a:r>
-          </a:p>
-          <a:p>
-            <a:pPr lvl="1"/>
-            <a:r>
-              <a:rPr lang="en-US" sz="2800" dirty="0"/>
-              <a:t>Directives provide frontend templating and modularization</a:t>
-            </a:r>
-          </a:p>
-          <a:p>
-            <a:pPr lvl="1"/>
-            <a:r>
-              <a:rPr lang="en-US" sz="2800" dirty="0"/>
-              <a:t>Services allow for reusable library modules</a:t>
-            </a:r>
-          </a:p>
-          <a:p>
-            <a:pPr lvl="1"/>
-            <a:r>
-              <a:rPr lang="en-US" sz="2800" dirty="0"/>
-              <a:t>HTML with Angular templating allow for two-way data binding between view and controller</a:t>
-            </a:r>
-          </a:p>
-        </p:txBody>
-      </p:sp>
-    </p:spTree>
-    <p:extLst>
-      <p:ext uri="{BB962C8B-B14F-4D97-AF65-F5344CB8AC3E}">
-        <p14:creationId xmlns:p14="http://schemas.microsoft.com/office/powerpoint/2010/main" val="1336446864"/>
-      </p:ext>
-    </p:extLst>
-  </p:cSld>
-  <p:clrMapOvr>
-    <a:masterClrMapping/>
-  </p:clrMapOvr>
-</p:sld>
-</file>
-
-<file path=ppt/slides/slide6.xml><?xml version="1.0" encoding="utf-8"?>
-<p:sld xmlns:a="http://schemas.openxmlformats.org/drawingml/2006/main" xmlns:r="http://schemas.openxmlformats.org/officeDocument/2006/relationships" xmlns:p="http://schemas.openxmlformats.org/presentationml/2006/main">
-  <p:cSld>
-    <p:spTree>
-      <p:nvGrpSpPr>
-        <p:cNvPr id="1" name=""/>
-        <p:cNvGrpSpPr/>
-        <p:nvPr/>
-      </p:nvGrpSpPr>
-      <p:grpSpPr>
-        <a:xfrm>
-          <a:off x="0" y="0"/>
-          <a:ext cx="0" cy="0"/>
-          <a:chOff x="0" y="0"/>
-          <a:chExt cx="0" cy="0"/>
-        </a:xfrm>
-      </p:grpSpPr>
-      <p:sp>
-        <p:nvSpPr>
-          <p:cNvPr id="2" name="Title 1"/>
-          <p:cNvSpPr>
-            <a:spLocks noGrp="1"/>
-          </p:cNvSpPr>
-          <p:nvPr>
-            <p:ph type="title"/>
-          </p:nvPr>
-        </p:nvSpPr>
-        <p:spPr/>
-        <p:txBody>
-          <a:bodyPr/>
-          <a:lstStyle/>
-          <a:p>
-            <a:r>
-              <a:rPr lang="en-US" dirty="0"/>
-              <a:t>Project Stack Cont.</a:t>
-            </a:r>
-          </a:p>
-        </p:txBody>
-      </p:sp>
-      <p:sp>
-        <p:nvSpPr>
-          <p:cNvPr id="3" name="Content Placeholder 2"/>
-          <p:cNvSpPr>
-            <a:spLocks noGrp="1"/>
-          </p:cNvSpPr>
-          <p:nvPr>
-            <p:ph idx="1"/>
-          </p:nvPr>
-        </p:nvSpPr>
-        <p:spPr/>
-        <p:txBody>
-          <a:bodyPr/>
-          <a:lstStyle/>
-          <a:p>
-            <a:r>
-              <a:rPr lang="en-US" sz="2800" dirty="0"/>
-              <a:t>Third Party Software</a:t>
-            </a:r>
-          </a:p>
-          <a:p>
-            <a:pPr lvl="1"/>
-            <a:r>
-              <a:rPr lang="en-US" sz="2400" dirty="0"/>
-              <a:t>Google Maps for showing geographical data</a:t>
-            </a:r>
-          </a:p>
-          <a:p>
-            <a:pPr lvl="1"/>
-            <a:r>
-              <a:rPr lang="en-US" sz="2400" dirty="0"/>
-              <a:t>D3 allows for rendering graphical representations</a:t>
-            </a:r>
-            <a:endParaRPr lang="en-US" sz="2600" dirty="0"/>
-          </a:p>
-          <a:p>
-            <a:r>
-              <a:rPr lang="en-US" sz="2800" dirty="0"/>
-              <a:t>Backend: Node JavaScript server</a:t>
-            </a:r>
-          </a:p>
-          <a:p>
-            <a:pPr lvl="1"/>
-            <a:r>
-              <a:rPr lang="en-US" sz="2400" dirty="0" err="1"/>
-              <a:t>ExpressJS</a:t>
-            </a:r>
-            <a:r>
-              <a:rPr lang="en-US" sz="2400" dirty="0"/>
-              <a:t> provides routing facilities</a:t>
-            </a:r>
-          </a:p>
-          <a:p>
-            <a:pPr lvl="1"/>
-            <a:r>
-              <a:rPr lang="en-US" sz="2400" dirty="0"/>
-              <a:t>Node file system library along with CSV library deserializes data on startup</a:t>
-            </a:r>
-          </a:p>
-          <a:p>
-            <a:endParaRPr lang="en-US" dirty="0"/>
-          </a:p>
-        </p:txBody>
-      </p:sp>
-    </p:spTree>
-    <p:extLst>
-      <p:ext uri="{BB962C8B-B14F-4D97-AF65-F5344CB8AC3E}">
-        <p14:creationId xmlns:p14="http://schemas.microsoft.com/office/powerpoint/2010/main" val="982542357"/>
-      </p:ext>
-    </p:extLst>
-  </p:cSld>
-  <p:clrMapOvr>
-    <a:masterClrMapping/>
-  </p:clrMapOvr>
-</p:sld>
-</file>
-
-<file path=ppt/slides/slide7.xml><?xml version="1.0" encoding="utf-8"?>
-<p:sld xmlns:a="http://schemas.openxmlformats.org/drawingml/2006/main" xmlns:r="http://schemas.openxmlformats.org/officeDocument/2006/relationships" xmlns:p="http://schemas.openxmlformats.org/presentationml/2006/main">
-  <p:cSld>
-    <p:spTree>
-      <p:nvGrpSpPr>
-        <p:cNvPr id="1" name=""/>
-        <p:cNvGrpSpPr/>
-        <p:nvPr/>
-      </p:nvGrpSpPr>
-      <p:grpSpPr>
-        <a:xfrm>
-          <a:off x="0" y="0"/>
-          <a:ext cx="0" cy="0"/>
-          <a:chOff x="0" y="0"/>
-          <a:chExt cx="0" cy="0"/>
-        </a:xfrm>
-      </p:grpSpPr>
-      <p:sp>
-        <p:nvSpPr>
-          <p:cNvPr id="2" name="Title 1"/>
-          <p:cNvSpPr>
-            <a:spLocks noGrp="1"/>
-          </p:cNvSpPr>
-          <p:nvPr>
-            <p:ph type="title"/>
-          </p:nvPr>
-        </p:nvSpPr>
-        <p:spPr/>
-        <p:txBody>
-          <a:bodyPr/>
-          <a:lstStyle/>
-          <a:p>
-            <a:r>
-              <a:rPr lang="en-US" dirty="0"/>
-              <a:t>Misc. Software</a:t>
-            </a:r>
-          </a:p>
-        </p:txBody>
-      </p:sp>
-      <p:sp>
-        <p:nvSpPr>
-          <p:cNvPr id="3" name="Content Placeholder 2"/>
-          <p:cNvSpPr>
-            <a:spLocks noGrp="1"/>
-          </p:cNvSpPr>
-          <p:nvPr>
-            <p:ph idx="1"/>
-          </p:nvPr>
-        </p:nvSpPr>
-        <p:spPr/>
-        <p:txBody>
-          <a:bodyPr>
-            <a:normAutofit/>
-          </a:bodyPr>
-          <a:lstStyle/>
-          <a:p>
-            <a:r>
-              <a:rPr lang="en-US" sz="2800" dirty="0" err="1"/>
-              <a:t>Lodash</a:t>
-            </a:r>
-            <a:r>
-              <a:rPr lang="en-US" sz="2800" dirty="0"/>
-              <a:t> – JavaScript data structure utility library</a:t>
-            </a:r>
-          </a:p>
-          <a:p>
-            <a:r>
-              <a:rPr lang="en-US" sz="2800" dirty="0" err="1"/>
-              <a:t>dateFormat</a:t>
-            </a:r>
-            <a:r>
-              <a:rPr lang="en-US" sz="2800" dirty="0"/>
-              <a:t>() – Library for JavaScript date formatting</a:t>
-            </a:r>
-          </a:p>
-          <a:p>
-            <a:r>
-              <a:rPr lang="en-US" sz="2800" dirty="0" err="1"/>
-              <a:t>MarkerClusterer</a:t>
-            </a:r>
-            <a:r>
-              <a:rPr lang="en-US" sz="2800" dirty="0"/>
-              <a:t> – Utility for grouping Google Map markers</a:t>
-            </a:r>
-          </a:p>
-          <a:p>
-            <a:r>
-              <a:rPr lang="en-US" sz="2800" dirty="0" err="1"/>
-              <a:t>SortTable</a:t>
-            </a:r>
-            <a:r>
-              <a:rPr lang="en-US" sz="2800" dirty="0"/>
-              <a:t> – Tool for making sortable HTML table headers</a:t>
-            </a:r>
-          </a:p>
-        </p:txBody>
-      </p:sp>
-    </p:spTree>
-    <p:extLst>
-      <p:ext uri="{BB962C8B-B14F-4D97-AF65-F5344CB8AC3E}">
-        <p14:creationId xmlns:p14="http://schemas.microsoft.com/office/powerpoint/2010/main" val="836344187"/>
-      </p:ext>
-    </p:extLst>
-  </p:cSld>
-  <p:clrMapOvr>
-    <a:masterClrMapping/>
-  </p:clrMapOvr>
-</p:sld>
-</file>
-
-<file path=ppt/slides/slide8.xml><?xml version="1.0" encoding="utf-8"?>
-<p:sld xmlns:a="http://schemas.openxmlformats.org/drawingml/2006/main" xmlns:r="http://schemas.openxmlformats.org/officeDocument/2006/relationships" xmlns:p="http://schemas.openxmlformats.org/presentationml/2006/main">
-  <p:cSld>
-    <p:spTree>
-      <p:nvGrpSpPr>
-        <p:cNvPr id="1" name=""/>
-        <p:cNvGrpSpPr/>
-        <p:nvPr/>
-      </p:nvGrpSpPr>
-      <p:grpSpPr>
-        <a:xfrm>
-          <a:off x="0" y="0"/>
-          <a:ext cx="0" cy="0"/>
-          <a:chOff x="0" y="0"/>
-          <a:chExt cx="0" cy="0"/>
-        </a:xfrm>
-      </p:grpSpPr>
-      <p:sp>
-        <p:nvSpPr>
-          <p:cNvPr id="2" name="Title 1"/>
-          <p:cNvSpPr>
-            <a:spLocks noGrp="1"/>
-          </p:cNvSpPr>
-          <p:nvPr>
-            <p:ph type="title"/>
-          </p:nvPr>
-        </p:nvSpPr>
-        <p:spPr/>
-        <p:txBody>
-          <a:bodyPr/>
-          <a:lstStyle/>
-          <a:p>
-            <a:r>
-              <a:rPr lang="en-US" dirty="0"/>
-              <a:t>Project Architecture</a:t>
-            </a:r>
-          </a:p>
-        </p:txBody>
-      </p:sp>
-    </p:spTree>
-    <p:extLst>
-      <p:ext uri="{BB962C8B-B14F-4D97-AF65-F5344CB8AC3E}">
-        <p14:creationId xmlns:p14="http://schemas.microsoft.com/office/powerpoint/2010/main" val="3383771456"/>
-      </p:ext>
-    </p:extLst>
-  </p:cSld>
-  <p:clrMapOvr>
-    <a:masterClrMapping/>
-  </p:clrMapOvr>
-</p:sld>
-</file>
-
 <file path=ppt/slides/slide9.xml><?xml version="1.0" encoding="utf-8"?>
 <p:sld xmlns:a="http://schemas.openxmlformats.org/drawingml/2006/main" xmlns:r="http://schemas.openxmlformats.org/officeDocument/2006/relationships" xmlns:p="http://schemas.openxmlformats.org/presentationml/2006/main">
   <p:cSld>
@@ -5752,43 +6876,15 @@
           <a:p>
             <a:r>
               <a:rPr lang="en-US" dirty="0"/>
-              <a:t>/</a:t>
-            </a:r>
-          </a:p>
-        </p:txBody>
-      </p:sp>
-      <p:pic>
-        <p:nvPicPr>
-          <p:cNvPr id="4" name="Content Placeholder 3"/>
-          <p:cNvPicPr>
-            <a:picLocks noGrp="1" noChangeAspect="1"/>
-          </p:cNvPicPr>
-          <p:nvPr>
-            <p:ph idx="1"/>
-          </p:nvPr>
-        </p:nvPicPr>
-        <p:blipFill rotWithShape="1">
-          <a:blip r:embed="rId2">
-            <a:extLst>
-              <a:ext uri="{28A0092B-C50C-407E-A947-70E740481C1C}">
-                <a14:useLocalDpi xmlns:a14="http://schemas.microsoft.com/office/drawing/2010/main" val="0"/>
-              </a:ext>
-            </a:extLst>
-          </a:blip>
-          <a:srcRect r="24738" b="58253"/>
-          <a:stretch/>
-        </p:blipFill>
-        <p:spPr>
-          <a:xfrm>
-            <a:off x="0" y="0"/>
-            <a:ext cx="12192000" cy="6858000"/>
-          </a:xfrm>
-        </p:spPr>
-      </p:pic>
+              <a:t>View 1: Map</a:t>
+            </a:r>
+          </a:p>
+        </p:txBody>
+      </p:sp>
     </p:spTree>
     <p:extLst>
       <p:ext uri="{BB962C8B-B14F-4D97-AF65-F5344CB8AC3E}">
-        <p14:creationId xmlns:p14="http://schemas.microsoft.com/office/powerpoint/2010/main" val="3928143034"/>
+        <p14:creationId xmlns:p14="http://schemas.microsoft.com/office/powerpoint/2010/main" val="3143127207"/>
       </p:ext>
     </p:extLst>
   </p:cSld>
@@ -6079,4 +7175,299 @@
     </a:ext>
   </a:extLst>
 </a:theme>
+</file>
+
+<file path=ppt/theme/theme2.xml><?xml version="1.0" encoding="utf-8"?>
+<a:theme xmlns:a="http://schemas.openxmlformats.org/drawingml/2006/main" name="Office Theme">
+  <a:themeElements>
+    <a:clrScheme name="Office">
+      <a:dk1>
+        <a:sysClr val="windowText" lastClr="000000"/>
+      </a:dk1>
+      <a:lt1>
+        <a:sysClr val="window" lastClr="FFFFFF"/>
+      </a:lt1>
+      <a:dk2>
+        <a:srgbClr val="44546A"/>
+      </a:dk2>
+      <a:lt2>
+        <a:srgbClr val="E7E6E6"/>
+      </a:lt2>
+      <a:accent1>
+        <a:srgbClr val="5B9BD5"/>
+      </a:accent1>
+      <a:accent2>
+        <a:srgbClr val="ED7D31"/>
+      </a:accent2>
+      <a:accent3>
+        <a:srgbClr val="A5A5A5"/>
+      </a:accent3>
+      <a:accent4>
+        <a:srgbClr val="FFC000"/>
+      </a:accent4>
+      <a:accent5>
+        <a:srgbClr val="4472C4"/>
+      </a:accent5>
+      <a:accent6>
+        <a:srgbClr val="70AD47"/>
+      </a:accent6>
+      <a:hlink>
+        <a:srgbClr val="0563C1"/>
+      </a:hlink>
+      <a:folHlink>
+        <a:srgbClr val="954F72"/>
+      </a:folHlink>
+    </a:clrScheme>
+    <a:fontScheme name="Office">
+      <a:majorFont>
+        <a:latin typeface="Calibri Light" panose="020F0302020204030204"/>
+        <a:ea typeface=""/>
+        <a:cs typeface=""/>
+        <a:font script="Jpan" typeface="游ゴシック Light"/>
+        <a:font script="Hang" typeface="맑은 고딕"/>
+        <a:font script="Hans" typeface="等线 Light"/>
+        <a:font script="Hant" typeface="新細明體"/>
+        <a:font script="Arab" typeface="Times New Roman"/>
+        <a:font script="Hebr" typeface="Times New Roman"/>
+        <a:font script="Thai" typeface="Angsana New"/>
+        <a:font script="Ethi" typeface="Nyala"/>
+        <a:font script="Beng" typeface="Vrinda"/>
+        <a:font script="Gujr" typeface="Shruti"/>
+        <a:font script="Khmr" typeface="MoolBoran"/>
+        <a:font script="Knda" typeface="Tunga"/>
+        <a:font script="Guru" typeface="Raavi"/>
+        <a:font script="Cans" typeface="Euphemia"/>
+        <a:font script="Cher" typeface="Plantagenet Cherokee"/>
+        <a:font script="Yiii" typeface="Microsoft Yi Baiti"/>
+        <a:font script="Tibt" typeface="Microsoft Himalaya"/>
+        <a:font script="Thaa" typeface="MV Boli"/>
+        <a:font script="Deva" typeface="Mangal"/>
+        <a:font script="Telu" typeface="Gautami"/>
+        <a:font script="Taml" typeface="Latha"/>
+        <a:font script="Syrc" typeface="Estrangelo Edessa"/>
+        <a:font script="Orya" typeface="Kalinga"/>
+        <a:font script="Mlym" typeface="Kartika"/>
+        <a:font script="Laoo" typeface="DokChampa"/>
+        <a:font script="Sinh" typeface="Iskoola Pota"/>
+        <a:font script="Mong" typeface="Mongolian Baiti"/>
+        <a:font script="Viet" typeface="Times New Roman"/>
+        <a:font script="Uigh" typeface="Microsoft Uighur"/>
+        <a:font script="Geor" typeface="Sylfaen"/>
+        <a:font script="Armn" typeface="Arial"/>
+        <a:font script="Bugi" typeface="Leelawadee UI"/>
+        <a:font script="Bopo" typeface="Microsoft JhengHei"/>
+        <a:font script="Java" typeface="Javanese Text"/>
+        <a:font script="Lisu" typeface="Segoe UI"/>
+        <a:font script="Mymr" typeface="Myanmar Text"/>
+        <a:font script="Nkoo" typeface="Ebrima"/>
+        <a:font script="Olck" typeface="Nirmala UI"/>
+        <a:font script="Osma" typeface="Ebrima"/>
+        <a:font script="Phag" typeface="Phagspa"/>
+        <a:font script="Syrn" typeface="Estrangelo Edessa"/>
+        <a:font script="Syrj" typeface="Estrangelo Edessa"/>
+        <a:font script="Syre" typeface="Estrangelo Edessa"/>
+        <a:font script="Sora" typeface="Nirmala UI"/>
+        <a:font script="Tale" typeface="Microsoft Tai Le"/>
+        <a:font script="Talu" typeface="Microsoft New Tai Lue"/>
+        <a:font script="Tfng" typeface="Ebrima"/>
+      </a:majorFont>
+      <a:minorFont>
+        <a:latin typeface="Calibri" panose="020F0502020204030204"/>
+        <a:ea typeface=""/>
+        <a:cs typeface=""/>
+        <a:font script="Jpan" typeface="游ゴシック"/>
+        <a:font script="Hang" typeface="맑은 고딕"/>
+        <a:font script="Hans" typeface="等线"/>
+        <a:font script="Hant" typeface="新細明體"/>
+        <a:font script="Arab" typeface="Arial"/>
+        <a:font script="Hebr" typeface="Arial"/>
+        <a:font script="Thai" typeface="Cordia New"/>
+        <a:font script="Ethi" typeface="Nyala"/>
+        <a:font script="Beng" typeface="Vrinda"/>
+        <a:font script="Gujr" typeface="Shruti"/>
+        <a:font script="Khmr" typeface="DaunPenh"/>
+        <a:font script="Knda" typeface="Tunga"/>
+        <a:font script="Guru" typeface="Raavi"/>
+        <a:font script="Cans" typeface="Euphemia"/>
+        <a:font script="Cher" typeface="Plantagenet Cherokee"/>
+        <a:font script="Yiii" typeface="Microsoft Yi Baiti"/>
+        <a:font script="Tibt" typeface="Microsoft Himalaya"/>
+        <a:font script="Thaa" typeface="MV Boli"/>
+        <a:font script="Deva" typeface="Mangal"/>
+        <a:font script="Telu" typeface="Gautami"/>
+        <a:font script="Taml" typeface="Latha"/>
+        <a:font script="Syrc" typeface="Estrangelo Edessa"/>
+        <a:font script="Orya" typeface="Kalinga"/>
+        <a:font script="Mlym" typeface="Kartika"/>
+        <a:font script="Laoo" typeface="DokChampa"/>
+        <a:font script="Sinh" typeface="Iskoola Pota"/>
+        <a:font script="Mong" typeface="Mongolian Baiti"/>
+        <a:font script="Viet" typeface="Arial"/>
+        <a:font script="Uigh" typeface="Microsoft Uighur"/>
+        <a:font script="Geor" typeface="Sylfaen"/>
+        <a:font script="Armn" typeface="Arial"/>
+        <a:font script="Bugi" typeface="Leelawadee UI"/>
+        <a:font script="Bopo" typeface="Microsoft JhengHei"/>
+        <a:font script="Java" typeface="Javanese Text"/>
+        <a:font script="Lisu" typeface="Segoe UI"/>
+        <a:font script="Mymr" typeface="Myanmar Text"/>
+        <a:font script="Nkoo" typeface="Ebrima"/>
+        <a:font script="Olck" typeface="Nirmala UI"/>
+        <a:font script="Osma" typeface="Ebrima"/>
+        <a:font script="Phag" typeface="Phagspa"/>
+        <a:font script="Syrn" typeface="Estrangelo Edessa"/>
+        <a:font script="Syrj" typeface="Estrangelo Edessa"/>
+        <a:font script="Syre" typeface="Estrangelo Edessa"/>
+        <a:font script="Sora" typeface="Nirmala UI"/>
+        <a:font script="Tale" typeface="Microsoft Tai Le"/>
+        <a:font script="Talu" typeface="Microsoft New Tai Lue"/>
+        <a:font script="Tfng" typeface="Ebrima"/>
+      </a:minorFont>
+    </a:fontScheme>
+    <a:fmtScheme name="Office">
+      <a:fillStyleLst>
+        <a:solidFill>
+          <a:schemeClr val="phClr"/>
+        </a:solidFill>
+        <a:gradFill rotWithShape="1">
+          <a:gsLst>
+            <a:gs pos="0">
+              <a:schemeClr val="phClr">
+                <a:lumMod val="110000"/>
+                <a:satMod val="105000"/>
+                <a:tint val="67000"/>
+              </a:schemeClr>
+            </a:gs>
+            <a:gs pos="50000">
+              <a:schemeClr val="phClr">
+                <a:lumMod val="105000"/>
+                <a:satMod val="103000"/>
+                <a:tint val="73000"/>
+              </a:schemeClr>
+            </a:gs>
+            <a:gs pos="100000">
+              <a:schemeClr val="phClr">
+                <a:lumMod val="105000"/>
+                <a:satMod val="109000"/>
+                <a:tint val="81000"/>
+              </a:schemeClr>
+            </a:gs>
+          </a:gsLst>
+          <a:lin ang="5400000" scaled="0"/>
+        </a:gradFill>
+        <a:gradFill rotWithShape="1">
+          <a:gsLst>
+            <a:gs pos="0">
+              <a:schemeClr val="phClr">
+                <a:satMod val="103000"/>
+                <a:lumMod val="102000"/>
+                <a:tint val="94000"/>
+              </a:schemeClr>
+            </a:gs>
+            <a:gs pos="50000">
+              <a:schemeClr val="phClr">
+                <a:satMod val="110000"/>
+                <a:lumMod val="100000"/>
+                <a:shade val="100000"/>
+              </a:schemeClr>
+            </a:gs>
+            <a:gs pos="100000">
+              <a:schemeClr val="phClr">
+                <a:lumMod val="99000"/>
+                <a:satMod val="120000"/>
+                <a:shade val="78000"/>
+              </a:schemeClr>
+            </a:gs>
+          </a:gsLst>
+          <a:lin ang="5400000" scaled="0"/>
+        </a:gradFill>
+      </a:fillStyleLst>
+      <a:lnStyleLst>
+        <a:ln w="6350" cap="flat" cmpd="sng" algn="ctr">
+          <a:solidFill>
+            <a:schemeClr val="phClr"/>
+          </a:solidFill>
+          <a:prstDash val="solid"/>
+          <a:miter lim="800000"/>
+        </a:ln>
+        <a:ln w="12700" cap="flat" cmpd="sng" algn="ctr">
+          <a:solidFill>
+            <a:schemeClr val="phClr"/>
+          </a:solidFill>
+          <a:prstDash val="solid"/>
+          <a:miter lim="800000"/>
+        </a:ln>
+        <a:ln w="19050" cap="flat" cmpd="sng" algn="ctr">
+          <a:solidFill>
+            <a:schemeClr val="phClr"/>
+          </a:solidFill>
+          <a:prstDash val="solid"/>
+          <a:miter lim="800000"/>
+        </a:ln>
+      </a:lnStyleLst>
+      <a:effectStyleLst>
+        <a:effectStyle>
+          <a:effectLst/>
+        </a:effectStyle>
+        <a:effectStyle>
+          <a:effectLst/>
+        </a:effectStyle>
+        <a:effectStyle>
+          <a:effectLst>
+            <a:outerShdw blurRad="57150" dist="19050" dir="5400000" algn="ctr" rotWithShape="0">
+              <a:srgbClr val="000000">
+                <a:alpha val="63000"/>
+              </a:srgbClr>
+            </a:outerShdw>
+          </a:effectLst>
+        </a:effectStyle>
+      </a:effectStyleLst>
+      <a:bgFillStyleLst>
+        <a:solidFill>
+          <a:schemeClr val="phClr"/>
+        </a:solidFill>
+        <a:solidFill>
+          <a:schemeClr val="phClr">
+            <a:tint val="95000"/>
+            <a:satMod val="170000"/>
+          </a:schemeClr>
+        </a:solidFill>
+        <a:gradFill rotWithShape="1">
+          <a:gsLst>
+            <a:gs pos="0">
+              <a:schemeClr val="phClr">
+                <a:tint val="93000"/>
+                <a:satMod val="150000"/>
+                <a:shade val="98000"/>
+                <a:lumMod val="102000"/>
+              </a:schemeClr>
+            </a:gs>
+            <a:gs pos="50000">
+              <a:schemeClr val="phClr">
+                <a:tint val="98000"/>
+                <a:satMod val="130000"/>
+                <a:shade val="90000"/>
+                <a:lumMod val="103000"/>
+              </a:schemeClr>
+            </a:gs>
+            <a:gs pos="100000">
+              <a:schemeClr val="phClr">
+                <a:shade val="63000"/>
+                <a:satMod val="120000"/>
+              </a:schemeClr>
+            </a:gs>
+          </a:gsLst>
+          <a:lin ang="5400000" scaled="0"/>
+        </a:gradFill>
+      </a:bgFillStyleLst>
+    </a:fmtScheme>
+  </a:themeElements>
+  <a:objectDefaults/>
+  <a:extraClrSchemeLst/>
+  <a:extLst>
+    <a:ext uri="{05A4C25C-085E-4340-85A3-A5531E510DB2}">
+      <thm15:themeFamily xmlns:thm15="http://schemas.microsoft.com/office/thememl/2012/main" name="Office Theme" id="{62F939B6-93AF-4DB8-9C6B-D6C7DFDC589F}" vid="{4A3C46E8-61CC-4603-A589-7422A47A8E4A}"/>
+    </a:ext>
+  </a:extLst>
+</a:theme>
 </file>
</xml_diff>